<commit_message>
power point presentation updated
</commit_message>
<xml_diff>
--- a/Sprint1_20200918.pptx
+++ b/Sprint1_20200918.pptx
@@ -5,7 +5,7 @@
     <p:sldMasterId id="2147483828" r:id="rId1"/>
   </p:sldMasterIdLst>
   <p:notesMasterIdLst>
-    <p:notesMasterId r:id="rId8"/>
+    <p:notesMasterId r:id="rId9"/>
   </p:notesMasterIdLst>
   <p:sldIdLst>
     <p:sldId id="256" r:id="rId2"/>
@@ -14,6 +14,7 @@
     <p:sldId id="260" r:id="rId5"/>
     <p:sldId id="259" r:id="rId6"/>
     <p:sldId id="263" r:id="rId7"/>
+    <p:sldId id="264" r:id="rId8"/>
   </p:sldIdLst>
   <p:sldSz cx="12192000" cy="6858000"/>
   <p:notesSz cx="6858000" cy="9144000"/>
@@ -123,9 +124,13 @@
 <file path=ppt/revisionInfo.xml><?xml version="1.0" encoding="utf-8"?>
 <p1510:revInfo xmlns:a="http://schemas.openxmlformats.org/drawingml/2006/main" xmlns:r="http://schemas.openxmlformats.org/officeDocument/2006/relationships" xmlns:p1510="http://schemas.microsoft.com/office/powerpoint/2015/10/main">
   <p1510:revLst>
+    <p1510:client id="{233EA21D-FA59-A41E-BCD6-9BF80CB0AECD}" v="1" dt="2020-09-18T03:04:51.116"/>
+    <p1510:client id="{2399029C-B978-41A9-96DB-7C5522197A3D}" v="14" dt="2020-09-18T02:15:50.253"/>
     <p1510:client id="{431D1C41-8935-D0C1-88DF-155C03CC08B6}" v="100" dt="2020-09-17T21:23:24.147"/>
+    <p1510:client id="{45E42403-E721-40D6-A502-93DFEE9579F6}" v="7" dt="2020-09-18T01:47:25.361"/>
     <p1510:client id="{4D74F9FB-8C49-38BE-898D-90A92B2B7421}" v="261" dt="2020-09-17T21:13:46.207"/>
     <p1510:client id="{5DA7E75A-2AC4-44CE-5E36-8999C3586DF3}" v="50" dt="2020-09-17T21:42:42.746"/>
+    <p1510:client id="{604069AC-2610-B916-6C83-8685034555D5}" v="9" dt="2020-09-18T02:14:34.819"/>
     <p1510:client id="{6DF907E7-8445-02F4-A1CD-4BBB685257A9}" v="1031" dt="2020-09-17T21:01:35.150"/>
     <p1510:client id="{B37002B1-D660-9445-7235-38DA4908E829}" v="22" dt="2020-09-17T21:14:33.071"/>
   </p1510:revLst>
@@ -4941,13 +4946,13 @@
         <a:lstStyle/>
         <a:p>
           <a:r>
-            <a:rPr lang="en-US" b="1" dirty="0">
+            <a:rPr lang="en-US" b="1">
               <a:latin typeface="Times New Roman" panose="02020603050405020304" pitchFamily="18" charset="0"/>
               <a:cs typeface="Times New Roman" panose="02020603050405020304" pitchFamily="18" charset="0"/>
             </a:rPr>
             <a:t>Problem Statement</a:t>
           </a:r>
-          <a:endParaRPr lang="en-US" dirty="0">
+          <a:endParaRPr lang="en-US">
             <a:latin typeface="Times New Roman" panose="02020603050405020304" pitchFamily="18" charset="0"/>
             <a:cs typeface="Times New Roman" panose="02020603050405020304" pitchFamily="18" charset="0"/>
           </a:endParaRPr>
@@ -4984,13 +4989,13 @@
         <a:lstStyle/>
         <a:p>
           <a:r>
-            <a:rPr lang="en-US" b="1" dirty="0">
+            <a:rPr lang="en-US" b="1">
               <a:latin typeface="Times New Roman" panose="02020603050405020304" pitchFamily="18" charset="0"/>
               <a:cs typeface="Times New Roman" panose="02020603050405020304" pitchFamily="18" charset="0"/>
             </a:rPr>
             <a:t>Methodology</a:t>
           </a:r>
-          <a:endParaRPr lang="en-US" dirty="0">
+          <a:endParaRPr lang="en-US">
             <a:latin typeface="Times New Roman" panose="02020603050405020304" pitchFamily="18" charset="0"/>
             <a:cs typeface="Times New Roman" panose="02020603050405020304" pitchFamily="18" charset="0"/>
           </a:endParaRPr>
@@ -5027,13 +5032,13 @@
         <a:lstStyle/>
         <a:p>
           <a:r>
-            <a:rPr lang="en-US" b="1" dirty="0">
+            <a:rPr lang="en-US" b="1">
               <a:latin typeface="Times New Roman" panose="02020603050405020304" pitchFamily="18" charset="0"/>
               <a:cs typeface="Times New Roman" panose="02020603050405020304" pitchFamily="18" charset="0"/>
             </a:rPr>
             <a:t>Value Proposition</a:t>
           </a:r>
-          <a:endParaRPr lang="en-US" dirty="0">
+          <a:endParaRPr lang="en-US">
             <a:latin typeface="Times New Roman" panose="02020603050405020304" pitchFamily="18" charset="0"/>
             <a:cs typeface="Times New Roman" panose="02020603050405020304" pitchFamily="18" charset="0"/>
           </a:endParaRPr>
@@ -5070,13 +5075,13 @@
         <a:lstStyle/>
         <a:p>
           <a:r>
-            <a:rPr lang="en-US" b="1" dirty="0">
+            <a:rPr lang="en-US" b="1">
               <a:latin typeface="Times New Roman" panose="02020603050405020304" pitchFamily="18" charset="0"/>
               <a:cs typeface="Times New Roman" panose="02020603050405020304" pitchFamily="18" charset="0"/>
             </a:rPr>
             <a:t>Development Milestones</a:t>
           </a:r>
-          <a:endParaRPr lang="en-US" dirty="0">
+          <a:endParaRPr lang="en-US">
             <a:latin typeface="Times New Roman" panose="02020603050405020304" pitchFamily="18" charset="0"/>
             <a:cs typeface="Times New Roman" panose="02020603050405020304" pitchFamily="18" charset="0"/>
           </a:endParaRPr>
@@ -5152,7 +5157,7 @@
         <a:lstStyle/>
         <a:p>
           <a:r>
-            <a:rPr lang="en-US" dirty="0">
+            <a:rPr lang="en-US">
               <a:latin typeface="Times New Roman" panose="02020603050405020304" pitchFamily="18" charset="0"/>
               <a:cs typeface="Times New Roman" panose="02020603050405020304" pitchFamily="18" charset="0"/>
             </a:rPr>
@@ -5191,7 +5196,7 @@
         <a:lstStyle/>
         <a:p>
           <a:r>
-            <a:rPr lang="en-US" dirty="0">
+            <a:rPr lang="en-US">
               <a:latin typeface="Times New Roman" panose="02020603050405020304" pitchFamily="18" charset="0"/>
               <a:cs typeface="Times New Roman" panose="02020603050405020304" pitchFamily="18" charset="0"/>
             </a:rPr>
@@ -5503,11 +5508,11 @@
         <a:lstStyle/>
         <a:p>
           <a:r>
-            <a:rPr lang="en-US">
+            <a:rPr lang="en-US" dirty="0">
               <a:latin typeface="Times New Roman" panose="02020603050405020304" pitchFamily="18" charset="0"/>
               <a:cs typeface="Times New Roman" panose="02020603050405020304" pitchFamily="18" charset="0"/>
             </a:rPr>
-            <a:t>14.1 Major Documentation Deliverables</a:t>
+            <a:t>Major Documentation Deliverables</a:t>
           </a:r>
         </a:p>
       </dgm:t>
@@ -5542,11 +5547,11 @@
         <a:lstStyle/>
         <a:p>
           <a:r>
-            <a:rPr lang="en-US">
+            <a:rPr lang="en-US" dirty="0">
               <a:latin typeface="Times New Roman" panose="02020603050405020304" pitchFamily="18" charset="0"/>
               <a:cs typeface="Times New Roman" panose="02020603050405020304" pitchFamily="18" charset="0"/>
             </a:rPr>
-            <a:t>14.2 Recurring Sprint Items</a:t>
+            <a:t>Recurring Sprint Items</a:t>
           </a:r>
         </a:p>
       </dgm:t>
@@ -5581,11 +5586,11 @@
         <a:lstStyle/>
         <a:p>
           <a:r>
-            <a:rPr lang="en-US">
+            <a:rPr lang="en-US" dirty="0">
               <a:latin typeface="Times New Roman" panose="02020603050405020304" pitchFamily="18" charset="0"/>
               <a:cs typeface="Times New Roman" panose="02020603050405020304" pitchFamily="18" charset="0"/>
             </a:rPr>
-            <a:t>14.3 Closeout Materials</a:t>
+            <a:t>Closeout Materials</a:t>
           </a:r>
         </a:p>
       </dgm:t>
@@ -5924,11 +5929,532 @@
         <a:lstStyle/>
         <a:p>
           <a:r>
+            <a:rPr lang="en-US" b="1">
+              <a:latin typeface="Times New Roman"/>
+              <a:cs typeface="Times New Roman"/>
+            </a:rPr>
+            <a:t>Problem Statement - Gabriela Aldrete and Bigyan Adhikari</a:t>
+          </a:r>
+          <a:endParaRPr lang="en-US" b="1" i="0" u="none" strike="noStrike" cap="none" baseline="0" noProof="0">
+            <a:solidFill>
+              <a:srgbClr val="010000"/>
+            </a:solidFill>
+            <a:latin typeface="Times New Roman"/>
+            <a:cs typeface="Times New Roman"/>
+          </a:endParaRPr>
+        </a:p>
+      </dgm:t>
+    </dgm:pt>
+    <dgm:pt modelId="{8622F8FF-E5ED-48FC-BE5C-C334C0F372AA}" type="parTrans" cxnId="{66E8B319-1665-4AE5-A354-F0EAE5F5C23A}">
+      <dgm:prSet/>
+      <dgm:spPr/>
+      <dgm:t>
+        <a:bodyPr/>
+        <a:lstStyle/>
+        <a:p>
+          <a:endParaRPr lang="en-US"/>
+        </a:p>
+      </dgm:t>
+    </dgm:pt>
+    <dgm:pt modelId="{2288CB91-78F7-4DDB-8E52-863D0308576F}" type="sibTrans" cxnId="{66E8B319-1665-4AE5-A354-F0EAE5F5C23A}">
+      <dgm:prSet/>
+      <dgm:spPr/>
+      <dgm:t>
+        <a:bodyPr/>
+        <a:lstStyle/>
+        <a:p>
+          <a:endParaRPr lang="en-US"/>
+        </a:p>
+      </dgm:t>
+    </dgm:pt>
+    <dgm:pt modelId="{D8051A47-18DE-4F29-9EBA-20FB28D830D4}">
+      <dgm:prSet/>
+      <dgm:spPr/>
+      <dgm:t>
+        <a:bodyPr/>
+        <a:lstStyle/>
+        <a:p>
+          <a:r>
+            <a:rPr lang="en-US" b="1">
+              <a:latin typeface="Times New Roman"/>
+              <a:cs typeface="Times New Roman"/>
+            </a:rPr>
+            <a:t>Methodology – Leutrim Dema and Duc Than</a:t>
+          </a:r>
+        </a:p>
+      </dgm:t>
+    </dgm:pt>
+    <dgm:pt modelId="{4CB117A7-D9BD-4DF7-8642-D0818DFAB5F0}" type="parTrans" cxnId="{B56F23E2-0B21-45C1-80CD-6DD9D4EA5E47}">
+      <dgm:prSet/>
+      <dgm:spPr/>
+      <dgm:t>
+        <a:bodyPr/>
+        <a:lstStyle/>
+        <a:p>
+          <a:endParaRPr lang="en-US"/>
+        </a:p>
+      </dgm:t>
+    </dgm:pt>
+    <dgm:pt modelId="{7864763F-4CDB-4F98-929E-C09FF8B4FCD8}" type="sibTrans" cxnId="{B56F23E2-0B21-45C1-80CD-6DD9D4EA5E47}">
+      <dgm:prSet/>
+      <dgm:spPr/>
+      <dgm:t>
+        <a:bodyPr/>
+        <a:lstStyle/>
+        <a:p>
+          <a:endParaRPr lang="en-US"/>
+        </a:p>
+      </dgm:t>
+    </dgm:pt>
+    <dgm:pt modelId="{674A1E82-C731-4FF3-A906-A77B8B3518D0}">
+      <dgm:prSet/>
+      <dgm:spPr/>
+      <dgm:t>
+        <a:bodyPr/>
+        <a:lstStyle/>
+        <a:p>
+          <a:pPr rtl="0"/>
+          <a:r>
+            <a:rPr lang="en-US" b="1">
+              <a:latin typeface="Times New Roman"/>
+              <a:cs typeface="Times New Roman"/>
+            </a:rPr>
+            <a:t>Value Proposition - Gabriela Aldrete and Thy Tran</a:t>
+          </a:r>
+        </a:p>
+      </dgm:t>
+    </dgm:pt>
+    <dgm:pt modelId="{EA51D958-2A41-47CD-8144-7C3FFF46DF3D}" type="parTrans" cxnId="{ACBEF9A6-2658-4D3E-81ED-66E390649C5A}">
+      <dgm:prSet/>
+      <dgm:spPr/>
+      <dgm:t>
+        <a:bodyPr/>
+        <a:lstStyle/>
+        <a:p>
+          <a:endParaRPr lang="en-US"/>
+        </a:p>
+      </dgm:t>
+    </dgm:pt>
+    <dgm:pt modelId="{30DD1720-3208-4B2A-A7AB-49939C7DCBAC}" type="sibTrans" cxnId="{ACBEF9A6-2658-4D3E-81ED-66E390649C5A}">
+      <dgm:prSet/>
+      <dgm:spPr/>
+      <dgm:t>
+        <a:bodyPr/>
+        <a:lstStyle/>
+        <a:p>
+          <a:endParaRPr lang="en-US"/>
+        </a:p>
+      </dgm:t>
+    </dgm:pt>
+    <dgm:pt modelId="{90EA3586-7C53-412D-9E2F-208FF9BAC60B}">
+      <dgm:prSet/>
+      <dgm:spPr/>
+      <dgm:t>
+        <a:bodyPr/>
+        <a:lstStyle/>
+        <a:p>
+          <a:r>
+            <a:rPr lang="en-US" b="1">
+              <a:latin typeface="Times New Roman"/>
+              <a:cs typeface="Times New Roman"/>
+            </a:rPr>
+            <a:t>Development Milestones - 4 members</a:t>
+          </a:r>
+        </a:p>
+      </dgm:t>
+    </dgm:pt>
+    <dgm:pt modelId="{DD37A7C5-B0A8-4961-818F-45A6963F657A}" type="parTrans" cxnId="{B4DC4B1B-8ED2-4804-AEE1-DC950A969627}">
+      <dgm:prSet/>
+      <dgm:spPr/>
+      <dgm:t>
+        <a:bodyPr/>
+        <a:lstStyle/>
+        <a:p>
+          <a:endParaRPr lang="en-US"/>
+        </a:p>
+      </dgm:t>
+    </dgm:pt>
+    <dgm:pt modelId="{61A52FE6-BA18-4B1C-92B7-D14E29097770}" type="sibTrans" cxnId="{B4DC4B1B-8ED2-4804-AEE1-DC950A969627}">
+      <dgm:prSet/>
+      <dgm:spPr/>
+      <dgm:t>
+        <a:bodyPr/>
+        <a:lstStyle/>
+        <a:p>
+          <a:endParaRPr lang="en-US"/>
+        </a:p>
+      </dgm:t>
+    </dgm:pt>
+    <dgm:pt modelId="{E218589D-1139-404E-B152-029EE245D655}">
+      <dgm:prSet/>
+      <dgm:spPr/>
+      <dgm:t>
+        <a:bodyPr/>
+        <a:lstStyle/>
+        <a:p>
+          <a:pPr rtl="0"/>
+          <a:r>
+            <a:rPr lang="en-US" b="1">
+              <a:latin typeface="Times New Roman"/>
+              <a:cs typeface="Times New Roman"/>
+            </a:rPr>
+            <a:t>Background -  Thy Tran and Duc Than</a:t>
+          </a:r>
+        </a:p>
+      </dgm:t>
+    </dgm:pt>
+    <dgm:pt modelId="{15B3D683-3568-40BB-B0BA-B2C3BC5A5402}" type="parTrans" cxnId="{753C7D5D-C563-4596-986E-8B2C0CAAB1F5}">
+      <dgm:prSet/>
+      <dgm:spPr/>
+      <dgm:t>
+        <a:bodyPr/>
+        <a:lstStyle/>
+        <a:p>
+          <a:endParaRPr lang="en-US"/>
+        </a:p>
+      </dgm:t>
+    </dgm:pt>
+    <dgm:pt modelId="{4004234B-DE6E-4521-9475-F6CDBD32F3E2}" type="sibTrans" cxnId="{753C7D5D-C563-4596-986E-8B2C0CAAB1F5}">
+      <dgm:prSet/>
+      <dgm:spPr/>
+      <dgm:t>
+        <a:bodyPr/>
+        <a:lstStyle/>
+        <a:p>
+          <a:endParaRPr lang="en-US"/>
+        </a:p>
+      </dgm:t>
+    </dgm:pt>
+    <dgm:pt modelId="{5F23B817-66C0-4A44-92D2-C4A89F3982F1}">
+      <dgm:prSet/>
+      <dgm:spPr/>
+      <dgm:t>
+        <a:bodyPr/>
+        <a:lstStyle/>
+        <a:p>
+          <a:r>
+            <a:rPr lang="en-US" b="1">
+              <a:latin typeface="Times New Roman"/>
+              <a:cs typeface="Times New Roman"/>
+            </a:rPr>
+            <a:t>Related Work -Thy Tran</a:t>
+          </a:r>
+        </a:p>
+      </dgm:t>
+    </dgm:pt>
+    <dgm:pt modelId="{76E3E0FD-5989-4552-A568-416708D3DF06}" type="parTrans" cxnId="{1864BEE4-DCD2-4C50-A49F-62D18F6B6AC4}">
+      <dgm:prSet/>
+      <dgm:spPr/>
+      <dgm:t>
+        <a:bodyPr/>
+        <a:lstStyle/>
+        <a:p>
+          <a:endParaRPr lang="en-US"/>
+        </a:p>
+      </dgm:t>
+    </dgm:pt>
+    <dgm:pt modelId="{CD5F0EDB-3471-4191-A1B4-AFC7AFA40B58}" type="sibTrans" cxnId="{1864BEE4-DCD2-4C50-A49F-62D18F6B6AC4}">
+      <dgm:prSet/>
+      <dgm:spPr/>
+      <dgm:t>
+        <a:bodyPr/>
+        <a:lstStyle/>
+        <a:p>
+          <a:endParaRPr lang="en-US"/>
+        </a:p>
+      </dgm:t>
+    </dgm:pt>
+    <dgm:pt modelId="{948C281C-C39F-4FC9-B39E-E8A123FD7E83}">
+      <dgm:prSet/>
+      <dgm:spPr/>
+      <dgm:t>
+        <a:bodyPr/>
+        <a:lstStyle/>
+        <a:p>
+          <a:pPr rtl="0"/>
+          <a:r>
+            <a:rPr lang="en-US" b="1">
+              <a:latin typeface="Times New Roman"/>
+              <a:cs typeface="Times New Roman"/>
+            </a:rPr>
+            <a:t>System Overview -Thy Tran and Leutrim Dema</a:t>
+          </a:r>
+        </a:p>
+      </dgm:t>
+    </dgm:pt>
+    <dgm:pt modelId="{00710822-119D-4D6F-8B57-3CF3C841FC0E}" type="parTrans" cxnId="{44427A0F-31BD-4799-98D9-BDB4E21B9FE9}">
+      <dgm:prSet/>
+      <dgm:spPr/>
+      <dgm:t>
+        <a:bodyPr/>
+        <a:lstStyle/>
+        <a:p>
+          <a:endParaRPr lang="en-US"/>
+        </a:p>
+      </dgm:t>
+    </dgm:pt>
+    <dgm:pt modelId="{A36FA0BA-266C-44F6-B02C-8352F9B373F2}" type="sibTrans" cxnId="{44427A0F-31BD-4799-98D9-BDB4E21B9FE9}">
+      <dgm:prSet/>
+      <dgm:spPr/>
+      <dgm:t>
+        <a:bodyPr/>
+        <a:lstStyle/>
+        <a:p>
+          <a:endParaRPr lang="en-US"/>
+        </a:p>
+      </dgm:t>
+    </dgm:pt>
+    <dgm:pt modelId="{AEA1CAAA-5373-4589-814E-D3B991F4BD0D}">
+      <dgm:prSet/>
+      <dgm:spPr/>
+      <dgm:t>
+        <a:bodyPr/>
+        <a:lstStyle/>
+        <a:p>
+          <a:pPr rtl="0"/>
+          <a:r>
+            <a:rPr lang="en-US" b="1">
+              <a:latin typeface="Times New Roman"/>
+              <a:cs typeface="Times New Roman"/>
+            </a:rPr>
+            <a:t>Roles and Responsibilities  - 4 members</a:t>
+          </a:r>
+        </a:p>
+      </dgm:t>
+    </dgm:pt>
+    <dgm:pt modelId="{42341BAE-0450-434B-8B36-AA4B9BA9474C}" type="parTrans" cxnId="{698AAD33-9A6D-416F-B919-A2FBA70F4DE4}">
+      <dgm:prSet/>
+      <dgm:spPr/>
+      <dgm:t>
+        <a:bodyPr/>
+        <a:lstStyle/>
+        <a:p>
+          <a:endParaRPr lang="en-US"/>
+        </a:p>
+      </dgm:t>
+    </dgm:pt>
+    <dgm:pt modelId="{C60315FB-77A5-4DDE-91FE-291818489409}" type="sibTrans" cxnId="{698AAD33-9A6D-416F-B919-A2FBA70F4DE4}">
+      <dgm:prSet/>
+      <dgm:spPr/>
+      <dgm:t>
+        <a:bodyPr/>
+        <a:lstStyle/>
+        <a:p>
+          <a:endParaRPr lang="en-US"/>
+        </a:p>
+      </dgm:t>
+    </dgm:pt>
+    <dgm:pt modelId="{3B1E071D-D7D7-4FA2-A59F-80424DA58F21}">
+      <dgm:prSet/>
+      <dgm:spPr/>
+      <dgm:t>
+        <a:bodyPr/>
+        <a:lstStyle/>
+        <a:p>
+          <a:pPr rtl="0"/>
+          <a:r>
+            <a:rPr lang="en-US" b="1">
+              <a:latin typeface="Times New Roman"/>
+              <a:cs typeface="Times New Roman"/>
+            </a:rPr>
+            <a:t>Cost Proposal – Gabriela Aldrete</a:t>
+          </a:r>
+        </a:p>
+      </dgm:t>
+    </dgm:pt>
+    <dgm:pt modelId="{2CDF64FF-6C9C-4A30-90DB-3616A542724E}" type="parTrans" cxnId="{D232E5C9-EF39-43A5-AC19-51D8E8EE8246}">
+      <dgm:prSet/>
+      <dgm:spPr/>
+      <dgm:t>
+        <a:bodyPr/>
+        <a:lstStyle/>
+        <a:p>
+          <a:endParaRPr lang="en-US"/>
+        </a:p>
+      </dgm:t>
+    </dgm:pt>
+    <dgm:pt modelId="{D78AE022-93F7-421A-BCD1-24EF3FCAC340}" type="sibTrans" cxnId="{D232E5C9-EF39-43A5-AC19-51D8E8EE8246}">
+      <dgm:prSet/>
+      <dgm:spPr/>
+      <dgm:t>
+        <a:bodyPr/>
+        <a:lstStyle/>
+        <a:p>
+          <a:endParaRPr lang="en-US"/>
+        </a:p>
+      </dgm:t>
+    </dgm:pt>
+    <dgm:pt modelId="{3C60E174-BFA2-46ED-B52E-666DED0449D7}">
+      <dgm:prSet/>
+      <dgm:spPr/>
+      <dgm:t>
+        <a:bodyPr/>
+        <a:lstStyle/>
+        <a:p>
+          <a:r>
+            <a:rPr lang="en-US" b="1">
+              <a:latin typeface="Times New Roman"/>
+              <a:cs typeface="Times New Roman"/>
+            </a:rPr>
+            <a:t>Facilities &amp; Equipment - Leutrim Dema</a:t>
+          </a:r>
+        </a:p>
+      </dgm:t>
+    </dgm:pt>
+    <dgm:pt modelId="{27B32F9F-F7CE-4CF4-B7DC-3A5242DBE945}" type="parTrans" cxnId="{BED47F48-1929-4379-B97D-D65749F11EFD}">
+      <dgm:prSet/>
+      <dgm:spPr/>
+      <dgm:t>
+        <a:bodyPr/>
+        <a:lstStyle/>
+        <a:p>
+          <a:endParaRPr lang="en-US"/>
+        </a:p>
+      </dgm:t>
+    </dgm:pt>
+    <dgm:pt modelId="{94B7338E-58AC-4C7A-A819-D0BEC7BDE7C1}" type="sibTrans" cxnId="{BED47F48-1929-4379-B97D-D65749F11EFD}">
+      <dgm:prSet/>
+      <dgm:spPr/>
+      <dgm:t>
+        <a:bodyPr/>
+        <a:lstStyle/>
+        <a:p>
+          <a:endParaRPr lang="en-US"/>
+        </a:p>
+      </dgm:t>
+    </dgm:pt>
+    <dgm:pt modelId="{EC63AEBA-CE87-4C03-8133-F26F86485237}">
+      <dgm:prSet/>
+      <dgm:spPr/>
+      <dgm:t>
+        <a:bodyPr/>
+        <a:lstStyle/>
+        <a:p>
+          <a:r>
+            <a:rPr lang="en-US" b="1">
+              <a:latin typeface="Times New Roman"/>
+              <a:cs typeface="Times New Roman"/>
+            </a:rPr>
+            <a:t>Assumptions - Duc Than</a:t>
+          </a:r>
+        </a:p>
+      </dgm:t>
+    </dgm:pt>
+    <dgm:pt modelId="{5CB4CD99-6AA2-4777-9277-E5B2EB64759F}" type="parTrans" cxnId="{DAB7FF3B-760A-4312-9860-56295A4BD232}">
+      <dgm:prSet/>
+      <dgm:spPr/>
+      <dgm:t>
+        <a:bodyPr/>
+        <a:lstStyle/>
+        <a:p>
+          <a:endParaRPr lang="en-US"/>
+        </a:p>
+      </dgm:t>
+    </dgm:pt>
+    <dgm:pt modelId="{62975A80-A0F4-4790-B009-C8BF3EABB3F3}" type="sibTrans" cxnId="{DAB7FF3B-760A-4312-9860-56295A4BD232}">
+      <dgm:prSet/>
+      <dgm:spPr/>
+      <dgm:t>
+        <a:bodyPr/>
+        <a:lstStyle/>
+        <a:p>
+          <a:endParaRPr lang="en-US"/>
+        </a:p>
+      </dgm:t>
+    </dgm:pt>
+    <dgm:pt modelId="{61EFED0A-F022-4927-A02D-84C8BF300EAF}">
+      <dgm:prSet/>
+      <dgm:spPr/>
+      <dgm:t>
+        <a:bodyPr/>
+        <a:lstStyle/>
+        <a:p>
+          <a:r>
+            <a:rPr lang="en-US" b="1">
+              <a:latin typeface="Times New Roman"/>
+              <a:cs typeface="Times New Roman"/>
+            </a:rPr>
+            <a:t>Constraints - Bigyan Adhikari</a:t>
+          </a:r>
+        </a:p>
+      </dgm:t>
+    </dgm:pt>
+    <dgm:pt modelId="{09927FB3-B323-430E-A2B8-C885BF0D3BCB}" type="parTrans" cxnId="{9578F3D5-6EAF-41AA-BDBC-CC8E8A52DFA5}">
+      <dgm:prSet/>
+      <dgm:spPr/>
+      <dgm:t>
+        <a:bodyPr/>
+        <a:lstStyle/>
+        <a:p>
+          <a:endParaRPr lang="en-US"/>
+        </a:p>
+      </dgm:t>
+    </dgm:pt>
+    <dgm:pt modelId="{E7F56D71-85E8-41D9-9305-65AB71EF242A}" type="sibTrans" cxnId="{9578F3D5-6EAF-41AA-BDBC-CC8E8A52DFA5}">
+      <dgm:prSet/>
+      <dgm:spPr/>
+      <dgm:t>
+        <a:bodyPr/>
+        <a:lstStyle/>
+        <a:p>
+          <a:endParaRPr lang="en-US"/>
+        </a:p>
+      </dgm:t>
+    </dgm:pt>
+    <dgm:pt modelId="{AA425E28-DF24-4345-96F6-1361FCC43306}">
+      <dgm:prSet/>
+      <dgm:spPr/>
+      <dgm:t>
+        <a:bodyPr/>
+        <a:lstStyle/>
+        <a:p>
+          <a:pPr rtl="0"/>
+          <a:r>
+            <a:rPr lang="en-US" b="1">
+              <a:latin typeface="Times New Roman"/>
+              <a:cs typeface="Times New Roman"/>
+            </a:rPr>
+            <a:t>Risks - Duc Tran and Gabriela Aldrete</a:t>
+          </a:r>
+        </a:p>
+      </dgm:t>
+    </dgm:pt>
+    <dgm:pt modelId="{76DC5EA2-14FE-419A-A6DB-176ED45B4FE9}" type="parTrans" cxnId="{3DAFC7E1-D422-4FD8-8797-63DCF9D67B86}">
+      <dgm:prSet/>
+      <dgm:spPr/>
+      <dgm:t>
+        <a:bodyPr/>
+        <a:lstStyle/>
+        <a:p>
+          <a:endParaRPr lang="en-US"/>
+        </a:p>
+      </dgm:t>
+    </dgm:pt>
+    <dgm:pt modelId="{6093DDEE-1632-4321-94AA-985AE7752D38}" type="sibTrans" cxnId="{3DAFC7E1-D422-4FD8-8797-63DCF9D67B86}">
+      <dgm:prSet/>
+      <dgm:spPr/>
+      <dgm:t>
+        <a:bodyPr/>
+        <a:lstStyle/>
+        <a:p>
+          <a:endParaRPr lang="en-US"/>
+        </a:p>
+      </dgm:t>
+    </dgm:pt>
+    <dgm:pt modelId="{B4C36D7F-52C2-4FAF-840F-43D3EC58A74C}">
+      <dgm:prSet/>
+      <dgm:spPr/>
+      <dgm:t>
+        <a:bodyPr/>
+        <a:lstStyle/>
+        <a:p>
+          <a:pPr rtl="0"/>
+          <a:r>
             <a:rPr lang="en-US" b="1" dirty="0">
               <a:latin typeface="Times New Roman"/>
               <a:cs typeface="Times New Roman"/>
             </a:rPr>
-            <a:t>Problem Statement - Gabriela Aldrete and </a:t>
+            <a:t>Major Documentation Deliverables - </a:t>
           </a:r>
           <a:r>
             <a:rPr lang="en-US" b="1" dirty="0" err="1">
@@ -5938,20 +6464,16 @@
             <a:t>Bigyan</a:t>
           </a:r>
           <a:r>
-            <a:rPr lang="en-US" b="1">
+            <a:rPr lang="en-US" b="1" dirty="0">
               <a:latin typeface="Times New Roman"/>
               <a:cs typeface="Times New Roman"/>
             </a:rPr>
-            <a:t> Adhikari</a:t>
+            <a:t> Adhikari and Thy Tran</a:t>
           </a:r>
-          <a:endParaRPr lang="en-US" dirty="0">
-            <a:latin typeface="Times New Roman"/>
-            <a:cs typeface="Times New Roman"/>
-          </a:endParaRPr>
         </a:p>
       </dgm:t>
     </dgm:pt>
-    <dgm:pt modelId="{8622F8FF-E5ED-48FC-BE5C-C334C0F372AA}" type="parTrans" cxnId="{66E8B319-1665-4AE5-A354-F0EAE5F5C23A}">
+    <dgm:pt modelId="{9E88EE7F-D3A2-4AE1-A815-7D071FE3B386}" type="parTrans" cxnId="{9DF095DF-12CF-41A3-97C8-755DC7C7C21E}">
       <dgm:prSet/>
       <dgm:spPr/>
       <dgm:t>
@@ -5962,7 +6484,7 @@
         </a:p>
       </dgm:t>
     </dgm:pt>
-    <dgm:pt modelId="{2288CB91-78F7-4DDB-8E52-863D0308576F}" type="sibTrans" cxnId="{66E8B319-1665-4AE5-A354-F0EAE5F5C23A}">
+    <dgm:pt modelId="{B4C30883-1C03-471D-B8CE-5489DA5A2FAD}" type="sibTrans" cxnId="{9DF095DF-12CF-41A3-97C8-755DC7C7C21E}">
       <dgm:prSet/>
       <dgm:spPr/>
       <dgm:t>
@@ -5973,19 +6495,20 @@
         </a:p>
       </dgm:t>
     </dgm:pt>
-    <dgm:pt modelId="{D8051A47-18DE-4F29-9EBA-20FB28D830D4}">
+    <dgm:pt modelId="{EC84776F-2A83-49C2-BE93-B7344D90583D}">
       <dgm:prSet/>
       <dgm:spPr/>
       <dgm:t>
         <a:bodyPr/>
         <a:lstStyle/>
         <a:p>
+          <a:pPr rtl="0"/>
           <a:r>
             <a:rPr lang="en-US" b="1" dirty="0">
               <a:latin typeface="Times New Roman"/>
               <a:cs typeface="Times New Roman"/>
             </a:rPr>
-            <a:t>Methodology – </a:t>
+            <a:t>Recurring Sprint Items - </a:t>
           </a:r>
           <a:r>
             <a:rPr lang="en-US" b="1" dirty="0" err="1">
@@ -6001,14 +6524,10 @@
             </a:rPr>
             <a:t> Dema and Duc Than</a:t>
           </a:r>
-          <a:endParaRPr lang="en-US" dirty="0">
-            <a:latin typeface="Times New Roman"/>
-            <a:cs typeface="Times New Roman"/>
-          </a:endParaRPr>
         </a:p>
       </dgm:t>
     </dgm:pt>
-    <dgm:pt modelId="{4CB117A7-D9BD-4DF7-8642-D0818DFAB5F0}" type="parTrans" cxnId="{B56F23E2-0B21-45C1-80CD-6DD9D4EA5E47}">
+    <dgm:pt modelId="{74526EAD-8BE7-409B-875B-0F505DADAA2F}" type="parTrans" cxnId="{E59CBB6C-BAA8-4DC0-81D5-A064932A3E9B}">
       <dgm:prSet/>
       <dgm:spPr/>
       <dgm:t>
@@ -6019,7 +6538,7 @@
         </a:p>
       </dgm:t>
     </dgm:pt>
-    <dgm:pt modelId="{7864763F-4CDB-4F98-929E-C09FF8B4FCD8}" type="sibTrans" cxnId="{B56F23E2-0B21-45C1-80CD-6DD9D4EA5E47}">
+    <dgm:pt modelId="{9EB91FAC-95F7-451D-877F-105D7562F8F1}" type="sibTrans" cxnId="{E59CBB6C-BAA8-4DC0-81D5-A064932A3E9B}">
       <dgm:prSet/>
       <dgm:spPr/>
       <dgm:t>
@@ -6030,7 +6549,7 @@
         </a:p>
       </dgm:t>
     </dgm:pt>
-    <dgm:pt modelId="{674A1E82-C731-4FF3-A906-A77B8B3518D0}">
+    <dgm:pt modelId="{68E88E73-4B55-4D53-8616-04B9A2CCF2D6}">
       <dgm:prSet/>
       <dgm:spPr/>
       <dgm:t>
@@ -6043,585 +6562,21 @@
               <a:latin typeface="Times New Roman"/>
               <a:cs typeface="Times New Roman"/>
             </a:rPr>
-            <a:t>Value Proposition - Gabriela Aldrete and Thy Tran</a:t>
-          </a:r>
-          <a:endParaRPr lang="en-US" dirty="0">
-            <a:latin typeface="Times New Roman" panose="02020603050405020304" pitchFamily="18" charset="0"/>
-            <a:cs typeface="Times New Roman" panose="02020603050405020304" pitchFamily="18" charset="0"/>
-          </a:endParaRPr>
-        </a:p>
-      </dgm:t>
-    </dgm:pt>
-    <dgm:pt modelId="{EA51D958-2A41-47CD-8144-7C3FFF46DF3D}" type="parTrans" cxnId="{ACBEF9A6-2658-4D3E-81ED-66E390649C5A}">
-      <dgm:prSet/>
-      <dgm:spPr/>
-      <dgm:t>
-        <a:bodyPr/>
-        <a:lstStyle/>
-        <a:p>
-          <a:endParaRPr lang="en-US"/>
-        </a:p>
-      </dgm:t>
-    </dgm:pt>
-    <dgm:pt modelId="{30DD1720-3208-4B2A-A7AB-49939C7DCBAC}" type="sibTrans" cxnId="{ACBEF9A6-2658-4D3E-81ED-66E390649C5A}">
-      <dgm:prSet/>
-      <dgm:spPr/>
-      <dgm:t>
-        <a:bodyPr/>
-        <a:lstStyle/>
-        <a:p>
-          <a:endParaRPr lang="en-US"/>
-        </a:p>
-      </dgm:t>
-    </dgm:pt>
-    <dgm:pt modelId="{90EA3586-7C53-412D-9E2F-208FF9BAC60B}">
-      <dgm:prSet/>
-      <dgm:spPr/>
-      <dgm:t>
-        <a:bodyPr/>
-        <a:lstStyle/>
-        <a:p>
-          <a:r>
-            <a:rPr lang="en-US" b="1" dirty="0">
-              <a:latin typeface="Times New Roman" panose="02020603050405020304" pitchFamily="18" charset="0"/>
-              <a:cs typeface="Times New Roman" panose="02020603050405020304" pitchFamily="18" charset="0"/>
-            </a:rPr>
-            <a:t>Development Milestones - 4 members</a:t>
-          </a:r>
-          <a:endParaRPr lang="en-US" dirty="0">
-            <a:latin typeface="Times New Roman" panose="02020603050405020304" pitchFamily="18" charset="0"/>
-            <a:cs typeface="Times New Roman" panose="02020603050405020304" pitchFamily="18" charset="0"/>
-          </a:endParaRPr>
-        </a:p>
-      </dgm:t>
-    </dgm:pt>
-    <dgm:pt modelId="{DD37A7C5-B0A8-4961-818F-45A6963F657A}" type="parTrans" cxnId="{B4DC4B1B-8ED2-4804-AEE1-DC950A969627}">
-      <dgm:prSet/>
-      <dgm:spPr/>
-      <dgm:t>
-        <a:bodyPr/>
-        <a:lstStyle/>
-        <a:p>
-          <a:endParaRPr lang="en-US"/>
-        </a:p>
-      </dgm:t>
-    </dgm:pt>
-    <dgm:pt modelId="{61A52FE6-BA18-4B1C-92B7-D14E29097770}" type="sibTrans" cxnId="{B4DC4B1B-8ED2-4804-AEE1-DC950A969627}">
-      <dgm:prSet/>
-      <dgm:spPr/>
-      <dgm:t>
-        <a:bodyPr/>
-        <a:lstStyle/>
-        <a:p>
-          <a:endParaRPr lang="en-US"/>
-        </a:p>
-      </dgm:t>
-    </dgm:pt>
-    <dgm:pt modelId="{E218589D-1139-404E-B152-029EE245D655}">
-      <dgm:prSet/>
-      <dgm:spPr/>
-      <dgm:t>
-        <a:bodyPr/>
-        <a:lstStyle/>
-        <a:p>
-          <a:pPr rtl="0"/>
-          <a:r>
-            <a:rPr lang="en-US" dirty="0">
-              <a:latin typeface="Times New Roman"/>
-              <a:cs typeface="Times New Roman"/>
-            </a:rPr>
-            <a:t>Background -  Thy Tran and Duck Than</a:t>
-          </a:r>
-        </a:p>
-      </dgm:t>
-    </dgm:pt>
-    <dgm:pt modelId="{15B3D683-3568-40BB-B0BA-B2C3BC5A5402}" type="parTrans" cxnId="{753C7D5D-C563-4596-986E-8B2C0CAAB1F5}">
-      <dgm:prSet/>
-      <dgm:spPr/>
-      <dgm:t>
-        <a:bodyPr/>
-        <a:lstStyle/>
-        <a:p>
-          <a:endParaRPr lang="en-US"/>
-        </a:p>
-      </dgm:t>
-    </dgm:pt>
-    <dgm:pt modelId="{4004234B-DE6E-4521-9475-F6CDBD32F3E2}" type="sibTrans" cxnId="{753C7D5D-C563-4596-986E-8B2C0CAAB1F5}">
-      <dgm:prSet/>
-      <dgm:spPr/>
-      <dgm:t>
-        <a:bodyPr/>
-        <a:lstStyle/>
-        <a:p>
-          <a:endParaRPr lang="en-US"/>
-        </a:p>
-      </dgm:t>
-    </dgm:pt>
-    <dgm:pt modelId="{5F23B817-66C0-4A44-92D2-C4A89F3982F1}">
-      <dgm:prSet/>
-      <dgm:spPr/>
-      <dgm:t>
-        <a:bodyPr/>
-        <a:lstStyle/>
-        <a:p>
-          <a:r>
-            <a:rPr lang="en-US" dirty="0">
-              <a:latin typeface="Times New Roman" panose="02020603050405020304" pitchFamily="18" charset="0"/>
-              <a:cs typeface="Times New Roman" panose="02020603050405020304" pitchFamily="18" charset="0"/>
-            </a:rPr>
-            <a:t>Related Work -Thy Tran</a:t>
-          </a:r>
-        </a:p>
-      </dgm:t>
-    </dgm:pt>
-    <dgm:pt modelId="{76E3E0FD-5989-4552-A568-416708D3DF06}" type="parTrans" cxnId="{1864BEE4-DCD2-4C50-A49F-62D18F6B6AC4}">
-      <dgm:prSet/>
-      <dgm:spPr/>
-      <dgm:t>
-        <a:bodyPr/>
-        <a:lstStyle/>
-        <a:p>
-          <a:endParaRPr lang="en-US"/>
-        </a:p>
-      </dgm:t>
-    </dgm:pt>
-    <dgm:pt modelId="{CD5F0EDB-3471-4191-A1B4-AFC7AFA40B58}" type="sibTrans" cxnId="{1864BEE4-DCD2-4C50-A49F-62D18F6B6AC4}">
-      <dgm:prSet/>
-      <dgm:spPr/>
-      <dgm:t>
-        <a:bodyPr/>
-        <a:lstStyle/>
-        <a:p>
-          <a:endParaRPr lang="en-US"/>
-        </a:p>
-      </dgm:t>
-    </dgm:pt>
-    <dgm:pt modelId="{948C281C-C39F-4FC9-B39E-E8A123FD7E83}">
-      <dgm:prSet/>
-      <dgm:spPr/>
-      <dgm:t>
-        <a:bodyPr/>
-        <a:lstStyle/>
-        <a:p>
-          <a:pPr rtl="0"/>
-          <a:r>
-            <a:rPr lang="en-US" dirty="0">
-              <a:latin typeface="Times New Roman"/>
-              <a:cs typeface="Times New Roman"/>
-            </a:rPr>
-            <a:t>System Overview -Thy Tran and Leutrim Dema</a:t>
-          </a:r>
-        </a:p>
-      </dgm:t>
-    </dgm:pt>
-    <dgm:pt modelId="{00710822-119D-4D6F-8B57-3CF3C841FC0E}" type="parTrans" cxnId="{44427A0F-31BD-4799-98D9-BDB4E21B9FE9}">
-      <dgm:prSet/>
-      <dgm:spPr/>
-      <dgm:t>
-        <a:bodyPr/>
-        <a:lstStyle/>
-        <a:p>
-          <a:endParaRPr lang="en-US"/>
-        </a:p>
-      </dgm:t>
-    </dgm:pt>
-    <dgm:pt modelId="{A36FA0BA-266C-44F6-B02C-8352F9B373F2}" type="sibTrans" cxnId="{44427A0F-31BD-4799-98D9-BDB4E21B9FE9}">
-      <dgm:prSet/>
-      <dgm:spPr/>
-      <dgm:t>
-        <a:bodyPr/>
-        <a:lstStyle/>
-        <a:p>
-          <a:endParaRPr lang="en-US"/>
-        </a:p>
-      </dgm:t>
-    </dgm:pt>
-    <dgm:pt modelId="{AEA1CAAA-5373-4589-814E-D3B991F4BD0D}">
-      <dgm:prSet/>
-      <dgm:spPr/>
-      <dgm:t>
-        <a:bodyPr/>
-        <a:lstStyle/>
-        <a:p>
-          <a:r>
-            <a:rPr lang="en-US" dirty="0">
-              <a:latin typeface="Times New Roman" panose="02020603050405020304" pitchFamily="18" charset="0"/>
-              <a:cs typeface="Times New Roman" panose="02020603050405020304" pitchFamily="18" charset="0"/>
-            </a:rPr>
-            <a:t>Roles and Responsibilities  - 4 members</a:t>
-          </a:r>
-        </a:p>
-      </dgm:t>
-    </dgm:pt>
-    <dgm:pt modelId="{42341BAE-0450-434B-8B36-AA4B9BA9474C}" type="parTrans" cxnId="{698AAD33-9A6D-416F-B919-A2FBA70F4DE4}">
-      <dgm:prSet/>
-      <dgm:spPr/>
-      <dgm:t>
-        <a:bodyPr/>
-        <a:lstStyle/>
-        <a:p>
-          <a:endParaRPr lang="en-US"/>
-        </a:p>
-      </dgm:t>
-    </dgm:pt>
-    <dgm:pt modelId="{C60315FB-77A5-4DDE-91FE-291818489409}" type="sibTrans" cxnId="{698AAD33-9A6D-416F-B919-A2FBA70F4DE4}">
-      <dgm:prSet/>
-      <dgm:spPr/>
-      <dgm:t>
-        <a:bodyPr/>
-        <a:lstStyle/>
-        <a:p>
-          <a:endParaRPr lang="en-US"/>
-        </a:p>
-      </dgm:t>
-    </dgm:pt>
-    <dgm:pt modelId="{3B1E071D-D7D7-4FA2-A59F-80424DA58F21}">
-      <dgm:prSet/>
-      <dgm:spPr/>
-      <dgm:t>
-        <a:bodyPr/>
-        <a:lstStyle/>
-        <a:p>
-          <a:pPr rtl="0"/>
-          <a:r>
-            <a:rPr lang="en-US" dirty="0">
-              <a:latin typeface="Times New Roman"/>
-              <a:cs typeface="Times New Roman"/>
-            </a:rPr>
-            <a:t>Cost Proposal – Gabriela Aldrete</a:t>
-          </a:r>
-        </a:p>
-      </dgm:t>
-    </dgm:pt>
-    <dgm:pt modelId="{2CDF64FF-6C9C-4A30-90DB-3616A542724E}" type="parTrans" cxnId="{D232E5C9-EF39-43A5-AC19-51D8E8EE8246}">
-      <dgm:prSet/>
-      <dgm:spPr/>
-      <dgm:t>
-        <a:bodyPr/>
-        <a:lstStyle/>
-        <a:p>
-          <a:endParaRPr lang="en-US"/>
-        </a:p>
-      </dgm:t>
-    </dgm:pt>
-    <dgm:pt modelId="{D78AE022-93F7-421A-BCD1-24EF3FCAC340}" type="sibTrans" cxnId="{D232E5C9-EF39-43A5-AC19-51D8E8EE8246}">
-      <dgm:prSet/>
-      <dgm:spPr/>
-      <dgm:t>
-        <a:bodyPr/>
-        <a:lstStyle/>
-        <a:p>
-          <a:endParaRPr lang="en-US"/>
-        </a:p>
-      </dgm:t>
-    </dgm:pt>
-    <dgm:pt modelId="{3C60E174-BFA2-46ED-B52E-666DED0449D7}">
-      <dgm:prSet/>
-      <dgm:spPr/>
-      <dgm:t>
-        <a:bodyPr/>
-        <a:lstStyle/>
-        <a:p>
-          <a:r>
-            <a:rPr lang="en-US" dirty="0">
-              <a:latin typeface="Times New Roman"/>
-              <a:cs typeface="Times New Roman"/>
-            </a:rPr>
-            <a:t>Facilities &amp; Equipment - </a:t>
+            <a:t>Closeout Materials – Gabriela Aldrete and </a:t>
           </a:r>
           <a:r>
-            <a:rPr lang="en-US" dirty="0" err="1">
+            <a:rPr lang="en-US" b="1" dirty="0" err="1">
               <a:latin typeface="Times New Roman"/>
               <a:cs typeface="Times New Roman"/>
             </a:rPr>
             <a:t>Leutrim</a:t>
           </a:r>
           <a:r>
-            <a:rPr lang="en-US" dirty="0">
+            <a:rPr lang="en-US" b="1" dirty="0">
               <a:latin typeface="Times New Roman"/>
               <a:cs typeface="Times New Roman"/>
             </a:rPr>
             <a:t> Dema</a:t>
-          </a:r>
-        </a:p>
-      </dgm:t>
-    </dgm:pt>
-    <dgm:pt modelId="{27B32F9F-F7CE-4CF4-B7DC-3A5242DBE945}" type="parTrans" cxnId="{BED47F48-1929-4379-B97D-D65749F11EFD}">
-      <dgm:prSet/>
-      <dgm:spPr/>
-      <dgm:t>
-        <a:bodyPr/>
-        <a:lstStyle/>
-        <a:p>
-          <a:endParaRPr lang="en-US"/>
-        </a:p>
-      </dgm:t>
-    </dgm:pt>
-    <dgm:pt modelId="{94B7338E-58AC-4C7A-A819-D0BEC7BDE7C1}" type="sibTrans" cxnId="{BED47F48-1929-4379-B97D-D65749F11EFD}">
-      <dgm:prSet/>
-      <dgm:spPr/>
-      <dgm:t>
-        <a:bodyPr/>
-        <a:lstStyle/>
-        <a:p>
-          <a:endParaRPr lang="en-US"/>
-        </a:p>
-      </dgm:t>
-    </dgm:pt>
-    <dgm:pt modelId="{EC63AEBA-CE87-4C03-8133-F26F86485237}">
-      <dgm:prSet/>
-      <dgm:spPr/>
-      <dgm:t>
-        <a:bodyPr/>
-        <a:lstStyle/>
-        <a:p>
-          <a:r>
-            <a:rPr lang="en-US" dirty="0">
-              <a:latin typeface="Times New Roman" panose="02020603050405020304" pitchFamily="18" charset="0"/>
-              <a:cs typeface="Times New Roman" panose="02020603050405020304" pitchFamily="18" charset="0"/>
-            </a:rPr>
-            <a:t>Assumptions - Duc Than</a:t>
-          </a:r>
-        </a:p>
-      </dgm:t>
-    </dgm:pt>
-    <dgm:pt modelId="{5CB4CD99-6AA2-4777-9277-E5B2EB64759F}" type="parTrans" cxnId="{DAB7FF3B-760A-4312-9860-56295A4BD232}">
-      <dgm:prSet/>
-      <dgm:spPr/>
-      <dgm:t>
-        <a:bodyPr/>
-        <a:lstStyle/>
-        <a:p>
-          <a:endParaRPr lang="en-US"/>
-        </a:p>
-      </dgm:t>
-    </dgm:pt>
-    <dgm:pt modelId="{62975A80-A0F4-4790-B009-C8BF3EABB3F3}" type="sibTrans" cxnId="{DAB7FF3B-760A-4312-9860-56295A4BD232}">
-      <dgm:prSet/>
-      <dgm:spPr/>
-      <dgm:t>
-        <a:bodyPr/>
-        <a:lstStyle/>
-        <a:p>
-          <a:endParaRPr lang="en-US"/>
-        </a:p>
-      </dgm:t>
-    </dgm:pt>
-    <dgm:pt modelId="{61EFED0A-F022-4927-A02D-84C8BF300EAF}">
-      <dgm:prSet/>
-      <dgm:spPr/>
-      <dgm:t>
-        <a:bodyPr/>
-        <a:lstStyle/>
-        <a:p>
-          <a:r>
-            <a:rPr lang="en-US" dirty="0">
-              <a:latin typeface="Times New Roman"/>
-              <a:cs typeface="Times New Roman"/>
-            </a:rPr>
-            <a:t>Constraints - </a:t>
-          </a:r>
-          <a:r>
-            <a:rPr lang="en-US" dirty="0" err="1">
-              <a:latin typeface="Times New Roman"/>
-              <a:cs typeface="Times New Roman"/>
-            </a:rPr>
-            <a:t>Bigyan</a:t>
-          </a:r>
-          <a:r>
-            <a:rPr lang="en-US" dirty="0">
-              <a:latin typeface="Times New Roman"/>
-              <a:cs typeface="Times New Roman"/>
-            </a:rPr>
-            <a:t> Adhikari</a:t>
-          </a:r>
-        </a:p>
-      </dgm:t>
-    </dgm:pt>
-    <dgm:pt modelId="{09927FB3-B323-430E-A2B8-C885BF0D3BCB}" type="parTrans" cxnId="{9578F3D5-6EAF-41AA-BDBC-CC8E8A52DFA5}">
-      <dgm:prSet/>
-      <dgm:spPr/>
-      <dgm:t>
-        <a:bodyPr/>
-        <a:lstStyle/>
-        <a:p>
-          <a:endParaRPr lang="en-US"/>
-        </a:p>
-      </dgm:t>
-    </dgm:pt>
-    <dgm:pt modelId="{E7F56D71-85E8-41D9-9305-65AB71EF242A}" type="sibTrans" cxnId="{9578F3D5-6EAF-41AA-BDBC-CC8E8A52DFA5}">
-      <dgm:prSet/>
-      <dgm:spPr/>
-      <dgm:t>
-        <a:bodyPr/>
-        <a:lstStyle/>
-        <a:p>
-          <a:endParaRPr lang="en-US"/>
-        </a:p>
-      </dgm:t>
-    </dgm:pt>
-    <dgm:pt modelId="{AA425E28-DF24-4345-96F6-1361FCC43306}">
-      <dgm:prSet/>
-      <dgm:spPr/>
-      <dgm:t>
-        <a:bodyPr/>
-        <a:lstStyle/>
-        <a:p>
-          <a:pPr rtl="0"/>
-          <a:r>
-            <a:rPr lang="en-US" dirty="0">
-              <a:latin typeface="Times New Roman"/>
-              <a:cs typeface="Times New Roman"/>
-            </a:rPr>
-            <a:t>Risks - Duc Tran and Gabriela Aldrete</a:t>
-          </a:r>
-        </a:p>
-      </dgm:t>
-    </dgm:pt>
-    <dgm:pt modelId="{76DC5EA2-14FE-419A-A6DB-176ED45B4FE9}" type="parTrans" cxnId="{3DAFC7E1-D422-4FD8-8797-63DCF9D67B86}">
-      <dgm:prSet/>
-      <dgm:spPr/>
-      <dgm:t>
-        <a:bodyPr/>
-        <a:lstStyle/>
-        <a:p>
-          <a:endParaRPr lang="en-US"/>
-        </a:p>
-      </dgm:t>
-    </dgm:pt>
-    <dgm:pt modelId="{6093DDEE-1632-4321-94AA-985AE7752D38}" type="sibTrans" cxnId="{3DAFC7E1-D422-4FD8-8797-63DCF9D67B86}">
-      <dgm:prSet/>
-      <dgm:spPr/>
-      <dgm:t>
-        <a:bodyPr/>
-        <a:lstStyle/>
-        <a:p>
-          <a:endParaRPr lang="en-US"/>
-        </a:p>
-      </dgm:t>
-    </dgm:pt>
-    <dgm:pt modelId="{B4C36D7F-52C2-4FAF-840F-43D3EC58A74C}">
-      <dgm:prSet/>
-      <dgm:spPr/>
-      <dgm:t>
-        <a:bodyPr/>
-        <a:lstStyle/>
-        <a:p>
-          <a:pPr rtl="0"/>
-          <a:r>
-            <a:rPr lang="en-US" dirty="0">
-              <a:latin typeface="Times New Roman"/>
-              <a:cs typeface="Times New Roman"/>
-            </a:rPr>
-            <a:t>14.1 Major Documentation Deliverables - </a:t>
-          </a:r>
-          <a:r>
-            <a:rPr lang="en-US" dirty="0" err="1">
-              <a:latin typeface="Times New Roman"/>
-              <a:cs typeface="Times New Roman"/>
-            </a:rPr>
-            <a:t>Bigyan</a:t>
-          </a:r>
-          <a:r>
-            <a:rPr lang="en-US" dirty="0">
-              <a:latin typeface="Times New Roman"/>
-              <a:cs typeface="Times New Roman"/>
-            </a:rPr>
-            <a:t> Adhikari and Thy Tran</a:t>
-          </a:r>
-        </a:p>
-      </dgm:t>
-    </dgm:pt>
-    <dgm:pt modelId="{9E88EE7F-D3A2-4AE1-A815-7D071FE3B386}" type="parTrans" cxnId="{9DF095DF-12CF-41A3-97C8-755DC7C7C21E}">
-      <dgm:prSet/>
-      <dgm:spPr/>
-      <dgm:t>
-        <a:bodyPr/>
-        <a:lstStyle/>
-        <a:p>
-          <a:endParaRPr lang="en-US"/>
-        </a:p>
-      </dgm:t>
-    </dgm:pt>
-    <dgm:pt modelId="{B4C30883-1C03-471D-B8CE-5489DA5A2FAD}" type="sibTrans" cxnId="{9DF095DF-12CF-41A3-97C8-755DC7C7C21E}">
-      <dgm:prSet/>
-      <dgm:spPr/>
-      <dgm:t>
-        <a:bodyPr/>
-        <a:lstStyle/>
-        <a:p>
-          <a:endParaRPr lang="en-US"/>
-        </a:p>
-      </dgm:t>
-    </dgm:pt>
-    <dgm:pt modelId="{EC84776F-2A83-49C2-BE93-B7344D90583D}">
-      <dgm:prSet/>
-      <dgm:spPr/>
-      <dgm:t>
-        <a:bodyPr/>
-        <a:lstStyle/>
-        <a:p>
-          <a:pPr rtl="0"/>
-          <a:r>
-            <a:rPr lang="en-US" dirty="0">
-              <a:latin typeface="Times New Roman"/>
-              <a:cs typeface="Times New Roman"/>
-            </a:rPr>
-            <a:t>14.2 Recurring Sprint Items - </a:t>
-          </a:r>
-          <a:r>
-            <a:rPr lang="en-US" dirty="0" err="1">
-              <a:latin typeface="Times New Roman"/>
-              <a:cs typeface="Times New Roman"/>
-            </a:rPr>
-            <a:t>Leutrim</a:t>
-          </a:r>
-          <a:r>
-            <a:rPr lang="en-US" dirty="0">
-              <a:latin typeface="Times New Roman"/>
-              <a:cs typeface="Times New Roman"/>
-            </a:rPr>
-            <a:t> Dema and Duc Than</a:t>
-          </a:r>
-        </a:p>
-      </dgm:t>
-    </dgm:pt>
-    <dgm:pt modelId="{74526EAD-8BE7-409B-875B-0F505DADAA2F}" type="parTrans" cxnId="{E59CBB6C-BAA8-4DC0-81D5-A064932A3E9B}">
-      <dgm:prSet/>
-      <dgm:spPr/>
-      <dgm:t>
-        <a:bodyPr/>
-        <a:lstStyle/>
-        <a:p>
-          <a:endParaRPr lang="en-US"/>
-        </a:p>
-      </dgm:t>
-    </dgm:pt>
-    <dgm:pt modelId="{9EB91FAC-95F7-451D-877F-105D7562F8F1}" type="sibTrans" cxnId="{E59CBB6C-BAA8-4DC0-81D5-A064932A3E9B}">
-      <dgm:prSet/>
-      <dgm:spPr/>
-      <dgm:t>
-        <a:bodyPr/>
-        <a:lstStyle/>
-        <a:p>
-          <a:endParaRPr lang="en-US"/>
-        </a:p>
-      </dgm:t>
-    </dgm:pt>
-    <dgm:pt modelId="{68E88E73-4B55-4D53-8616-04B9A2CCF2D6}">
-      <dgm:prSet/>
-      <dgm:spPr/>
-      <dgm:t>
-        <a:bodyPr/>
-        <a:lstStyle/>
-        <a:p>
-          <a:pPr rtl="0"/>
-          <a:r>
-            <a:rPr lang="en-US" dirty="0">
-              <a:latin typeface="Times New Roman"/>
-              <a:cs typeface="Times New Roman"/>
-            </a:rPr>
-            <a:t>14.3 Closeout Materials – Gabriela Aldrete and Leutrim Dema</a:t>
           </a:r>
         </a:p>
       </dgm:t>
@@ -7051,12 +7006,19 @@
             </a:lnSpc>
           </a:pPr>
           <a:r>
-            <a:rPr lang="en-US" sz="2400" b="0" i="0" u="none" strike="noStrike" cap="none" baseline="0" noProof="0" dirty="0">
+            <a:rPr lang="en-US" sz="2400" b="1" i="0" u="none" strike="noStrike" cap="none" baseline="0" noProof="0">
               <a:latin typeface="Times New Roman"/>
               <a:cs typeface="Times New Roman"/>
             </a:rPr>
             <a:t>SCRUM MASTER: Leutrim Dema</a:t>
           </a:r>
+          <a:endParaRPr lang="en-US" sz="2400" b="1" i="0" u="none" strike="noStrike" cap="none" baseline="0" noProof="0">
+            <a:solidFill>
+              <a:srgbClr val="010000"/>
+            </a:solidFill>
+            <a:latin typeface="Times New Roman"/>
+            <a:cs typeface="Times New Roman"/>
+          </a:endParaRPr>
         </a:p>
       </dgm:t>
     </dgm:pt>
@@ -7095,18 +7057,14 @@
             </a:lnSpc>
           </a:pPr>
           <a:r>
-            <a:rPr lang="en-US" sz="2300" dirty="0">
+            <a:rPr lang="en-US" sz="2300" b="1">
               <a:latin typeface="Times New Roman"/>
               <a:cs typeface="Times New Roman"/>
             </a:rPr>
             <a:t>BUSINESS PLANNER: Gabriela Aldrete  </a:t>
           </a:r>
-          <a:r>
-            <a:rPr lang="en-US" dirty="0"/>
-            <a:t> </a:t>
-          </a:r>
-          <a:endParaRPr lang="en-US" sz="2300" dirty="0">
-            <a:latin typeface="Times New Roman"/>
+          <a:endParaRPr lang="en-US" sz="2300" b="1">
+            <a:latin typeface="Rockwell Condensed"/>
             <a:cs typeface="Times New Roman"/>
           </a:endParaRPr>
         </a:p>
@@ -7303,7 +7261,7 @@
             </a:rPr>
             <a:t>Problem Statement - 4hrs</a:t>
           </a:r>
-          <a:endParaRPr lang="en-US"/>
+          <a:endParaRPr lang="en-US" b="1"/>
         </a:p>
       </dgm:t>
     </dgm:pt>
@@ -7338,7 +7296,7 @@
         <a:p>
           <a:pPr rtl="0"/>
           <a:r>
-            <a:rPr lang="en-US" b="1" dirty="0">
+            <a:rPr lang="en-US" b="1">
               <a:latin typeface="Times New Roman"/>
               <a:cs typeface="Times New Roman"/>
             </a:rPr>
@@ -7378,16 +7336,12 @@
         <a:p>
           <a:pPr rtl="0"/>
           <a:r>
-            <a:rPr lang="en-US" b="1" dirty="0">
+            <a:rPr lang="en-US" b="1">
               <a:latin typeface="Times New Roman"/>
               <a:cs typeface="Times New Roman"/>
             </a:rPr>
             <a:t>Value Proposition - 4hrs</a:t>
           </a:r>
-          <a:endParaRPr lang="en-US" dirty="0">
-            <a:latin typeface="Times New Roman" panose="02020603050405020304" pitchFamily="18" charset="0"/>
-            <a:cs typeface="Times New Roman" panose="02020603050405020304" pitchFamily="18" charset="0"/>
-          </a:endParaRPr>
         </a:p>
       </dgm:t>
     </dgm:pt>
@@ -7422,16 +7376,12 @@
         <a:p>
           <a:pPr rtl="0"/>
           <a:r>
-            <a:rPr lang="en-US" b="1" dirty="0">
+            <a:rPr lang="en-US" b="1">
               <a:latin typeface="Times New Roman"/>
               <a:cs typeface="Times New Roman"/>
             </a:rPr>
             <a:t>Development Milestones - 6hrs</a:t>
           </a:r>
-          <a:endParaRPr lang="en-US" dirty="0">
-            <a:latin typeface="Times New Roman" panose="02020603050405020304" pitchFamily="18" charset="0"/>
-            <a:cs typeface="Times New Roman" panose="02020603050405020304" pitchFamily="18" charset="0"/>
-          </a:endParaRPr>
         </a:p>
       </dgm:t>
     </dgm:pt>
@@ -7466,7 +7416,7 @@
         <a:p>
           <a:pPr rtl="0"/>
           <a:r>
-            <a:rPr lang="en-US" dirty="0">
+            <a:rPr lang="en-US" b="1">
               <a:latin typeface="Times New Roman"/>
               <a:cs typeface="Times New Roman"/>
             </a:rPr>
@@ -7506,7 +7456,7 @@
         <a:p>
           <a:pPr rtl="0"/>
           <a:r>
-            <a:rPr lang="en-US" dirty="0">
+            <a:rPr lang="en-US" b="1">
               <a:latin typeface="Times New Roman"/>
               <a:cs typeface="Times New Roman"/>
             </a:rPr>
@@ -7546,7 +7496,7 @@
         <a:p>
           <a:pPr rtl="0"/>
           <a:r>
-            <a:rPr lang="en-US" dirty="0">
+            <a:rPr lang="en-US" b="1">
               <a:latin typeface="Times New Roman"/>
               <a:cs typeface="Times New Roman"/>
             </a:rPr>
@@ -7586,7 +7536,7 @@
         <a:p>
           <a:pPr rtl="0"/>
           <a:r>
-            <a:rPr lang="en-US" dirty="0">
+            <a:rPr lang="en-US" b="1">
               <a:latin typeface="Times New Roman"/>
               <a:cs typeface="Times New Roman"/>
             </a:rPr>
@@ -7626,7 +7576,7 @@
         <a:p>
           <a:pPr rtl="0"/>
           <a:r>
-            <a:rPr lang="en-US" dirty="0">
+            <a:rPr lang="en-US" b="1">
               <a:latin typeface="Times New Roman"/>
               <a:cs typeface="Times New Roman"/>
             </a:rPr>
@@ -7666,7 +7616,7 @@
         <a:p>
           <a:pPr rtl="0"/>
           <a:r>
-            <a:rPr lang="en-US" dirty="0">
+            <a:rPr lang="en-US" b="1">
               <a:latin typeface="Times New Roman"/>
               <a:cs typeface="Times New Roman"/>
             </a:rPr>
@@ -7706,7 +7656,7 @@
         <a:p>
           <a:pPr rtl="0"/>
           <a:r>
-            <a:rPr lang="en-US" dirty="0">
+            <a:rPr lang="en-US" b="1">
               <a:latin typeface="Times New Roman"/>
               <a:cs typeface="Times New Roman"/>
             </a:rPr>
@@ -7746,7 +7696,7 @@
         <a:p>
           <a:pPr rtl="0"/>
           <a:r>
-            <a:rPr lang="en-US" dirty="0">
+            <a:rPr lang="en-US" b="1">
               <a:latin typeface="Times New Roman"/>
               <a:cs typeface="Times New Roman"/>
             </a:rPr>
@@ -7786,7 +7736,7 @@
         <a:p>
           <a:pPr rtl="0"/>
           <a:r>
-            <a:rPr lang="en-US" dirty="0">
+            <a:rPr lang="en-US" b="1">
               <a:latin typeface="Times New Roman"/>
               <a:cs typeface="Times New Roman"/>
             </a:rPr>
@@ -7826,7 +7776,7 @@
         <a:p>
           <a:pPr rtl="0"/>
           <a:r>
-            <a:rPr lang="en-US" dirty="0">
+            <a:rPr lang="en-US" b="1">
               <a:latin typeface="Times New Roman"/>
               <a:cs typeface="Times New Roman"/>
             </a:rPr>
@@ -7866,7 +7816,7 @@
         <a:p>
           <a:pPr rtl="0"/>
           <a:r>
-            <a:rPr lang="en-US" dirty="0">
+            <a:rPr lang="en-US" b="1">
               <a:latin typeface="Times New Roman"/>
               <a:cs typeface="Times New Roman"/>
             </a:rPr>
@@ -8696,13 +8646,13 @@
             <a:buNone/>
           </a:pPr>
           <a:r>
-            <a:rPr lang="en-US" sz="1800" b="1" kern="1200" dirty="0">
+            <a:rPr lang="en-US" sz="1800" b="1" kern="1200">
               <a:latin typeface="Times New Roman" panose="02020603050405020304" pitchFamily="18" charset="0"/>
               <a:cs typeface="Times New Roman" panose="02020603050405020304" pitchFamily="18" charset="0"/>
             </a:rPr>
             <a:t>Problem Statement</a:t>
           </a:r>
-          <a:endParaRPr lang="en-US" sz="1800" kern="1200" dirty="0">
+          <a:endParaRPr lang="en-US" sz="1800" kern="1200">
             <a:latin typeface="Times New Roman" panose="02020603050405020304" pitchFamily="18" charset="0"/>
             <a:cs typeface="Times New Roman" panose="02020603050405020304" pitchFamily="18" charset="0"/>
           </a:endParaRPr>
@@ -8780,13 +8730,13 @@
             <a:buNone/>
           </a:pPr>
           <a:r>
-            <a:rPr lang="en-US" sz="1800" b="1" kern="1200" dirty="0">
+            <a:rPr lang="en-US" sz="1800" b="1" kern="1200">
               <a:latin typeface="Times New Roman" panose="02020603050405020304" pitchFamily="18" charset="0"/>
               <a:cs typeface="Times New Roman" panose="02020603050405020304" pitchFamily="18" charset="0"/>
             </a:rPr>
             <a:t>Methodology</a:t>
           </a:r>
-          <a:endParaRPr lang="en-US" sz="1800" kern="1200" dirty="0">
+          <a:endParaRPr lang="en-US" sz="1800" kern="1200">
             <a:latin typeface="Times New Roman" panose="02020603050405020304" pitchFamily="18" charset="0"/>
             <a:cs typeface="Times New Roman" panose="02020603050405020304" pitchFamily="18" charset="0"/>
           </a:endParaRPr>
@@ -8864,13 +8814,13 @@
             <a:buNone/>
           </a:pPr>
           <a:r>
-            <a:rPr lang="en-US" sz="1800" b="1" kern="1200" dirty="0">
+            <a:rPr lang="en-US" sz="1800" b="1" kern="1200">
               <a:latin typeface="Times New Roman" panose="02020603050405020304" pitchFamily="18" charset="0"/>
               <a:cs typeface="Times New Roman" panose="02020603050405020304" pitchFamily="18" charset="0"/>
             </a:rPr>
             <a:t>Value Proposition</a:t>
           </a:r>
-          <a:endParaRPr lang="en-US" sz="1800" kern="1200" dirty="0">
+          <a:endParaRPr lang="en-US" sz="1800" kern="1200">
             <a:latin typeface="Times New Roman" panose="02020603050405020304" pitchFamily="18" charset="0"/>
             <a:cs typeface="Times New Roman" panose="02020603050405020304" pitchFamily="18" charset="0"/>
           </a:endParaRPr>
@@ -8948,13 +8898,13 @@
             <a:buNone/>
           </a:pPr>
           <a:r>
-            <a:rPr lang="en-US" sz="1800" b="1" kern="1200" dirty="0">
+            <a:rPr lang="en-US" sz="1800" b="1" kern="1200">
               <a:latin typeface="Times New Roman" panose="02020603050405020304" pitchFamily="18" charset="0"/>
               <a:cs typeface="Times New Roman" panose="02020603050405020304" pitchFamily="18" charset="0"/>
             </a:rPr>
             <a:t>Development Milestones</a:t>
           </a:r>
-          <a:endParaRPr lang="en-US" sz="1800" kern="1200" dirty="0">
+          <a:endParaRPr lang="en-US" sz="1800" kern="1200">
             <a:latin typeface="Times New Roman" panose="02020603050405020304" pitchFamily="18" charset="0"/>
             <a:cs typeface="Times New Roman" panose="02020603050405020304" pitchFamily="18" charset="0"/>
           </a:endParaRPr>
@@ -9112,7 +9062,7 @@
             <a:buNone/>
           </a:pPr>
           <a:r>
-            <a:rPr lang="en-US" sz="1800" kern="1200" dirty="0">
+            <a:rPr lang="en-US" sz="1800" kern="1200">
               <a:latin typeface="Times New Roman" panose="02020603050405020304" pitchFamily="18" charset="0"/>
               <a:cs typeface="Times New Roman" panose="02020603050405020304" pitchFamily="18" charset="0"/>
             </a:rPr>
@@ -9192,7 +9142,7 @@
             <a:buNone/>
           </a:pPr>
           <a:r>
-            <a:rPr lang="en-US" sz="1800" kern="1200" dirty="0">
+            <a:rPr lang="en-US" sz="1800" kern="1200">
               <a:latin typeface="Times New Roman" panose="02020603050405020304" pitchFamily="18" charset="0"/>
               <a:cs typeface="Times New Roman" panose="02020603050405020304" pitchFamily="18" charset="0"/>
             </a:rPr>
@@ -9832,11 +9782,11 @@
             <a:buNone/>
           </a:pPr>
           <a:r>
-            <a:rPr lang="en-US" sz="1800" kern="1200">
+            <a:rPr lang="en-US" sz="1800" kern="1200" dirty="0">
               <a:latin typeface="Times New Roman" panose="02020603050405020304" pitchFamily="18" charset="0"/>
               <a:cs typeface="Times New Roman" panose="02020603050405020304" pitchFamily="18" charset="0"/>
             </a:rPr>
-            <a:t>14.1 Major Documentation Deliverables</a:t>
+            <a:t>Major Documentation Deliverables</a:t>
           </a:r>
         </a:p>
       </dsp:txBody>
@@ -9912,11 +9862,11 @@
             <a:buNone/>
           </a:pPr>
           <a:r>
-            <a:rPr lang="en-US" sz="1800" kern="1200">
+            <a:rPr lang="en-US" sz="1800" kern="1200" dirty="0">
               <a:latin typeface="Times New Roman" panose="02020603050405020304" pitchFamily="18" charset="0"/>
               <a:cs typeface="Times New Roman" panose="02020603050405020304" pitchFamily="18" charset="0"/>
             </a:rPr>
-            <a:t>14.2 Recurring Sprint Items</a:t>
+            <a:t>Recurring Sprint Items</a:t>
           </a:r>
         </a:p>
       </dsp:txBody>
@@ -9992,11 +9942,11 @@
             <a:buNone/>
           </a:pPr>
           <a:r>
-            <a:rPr lang="en-US" sz="1800" kern="1200">
+            <a:rPr lang="en-US" sz="1800" kern="1200" dirty="0">
               <a:latin typeface="Times New Roman" panose="02020603050405020304" pitchFamily="18" charset="0"/>
               <a:cs typeface="Times New Roman" panose="02020603050405020304" pitchFamily="18" charset="0"/>
             </a:rPr>
-            <a:t>14.3 Closeout Materials</a:t>
+            <a:t>Closeout Materials</a:t>
           </a:r>
         </a:p>
       </dsp:txBody>
@@ -10025,7 +9975,7 @@
       <dsp:spPr>
         <a:xfrm>
           <a:off x="0" y="0"/>
-          <a:ext cx="5141912" cy="0"/>
+          <a:ext cx="5238777" cy="0"/>
         </a:xfrm>
         <a:prstGeom prst="line">
           <a:avLst/>
@@ -10074,7 +10024,7 @@
       <dsp:spPr>
         <a:xfrm>
           <a:off x="0" y="0"/>
-          <a:ext cx="5141912" cy="337939"/>
+          <a:ext cx="5238777" cy="337939"/>
         </a:xfrm>
         <a:prstGeom prst="rect">
           <a:avLst/>
@@ -10116,27 +10066,16 @@
             <a:buNone/>
           </a:pPr>
           <a:r>
-            <a:rPr lang="en-US" sz="1300" b="1" kern="1200" dirty="0">
-              <a:latin typeface="Times New Roman"/>
-              <a:cs typeface="Times New Roman"/>
-            </a:rPr>
-            <a:t>Problem Statement - Gabriela Aldrete and </a:t>
-          </a:r>
-          <a:r>
-            <a:rPr lang="en-US" sz="1300" b="1" kern="1200" dirty="0" err="1">
-              <a:latin typeface="Times New Roman"/>
-              <a:cs typeface="Times New Roman"/>
-            </a:rPr>
-            <a:t>Bigyan</a:t>
-          </a:r>
-          <a:r>
             <a:rPr lang="en-US" sz="1300" b="1" kern="1200">
               <a:latin typeface="Times New Roman"/>
               <a:cs typeface="Times New Roman"/>
             </a:rPr>
-            <a:t> Adhikari</a:t>
+            <a:t>Problem Statement - Gabriela Aldrete and Bigyan Adhikari</a:t>
           </a:r>
-          <a:endParaRPr lang="en-US" sz="1300" kern="1200" dirty="0">
+          <a:endParaRPr lang="en-US" sz="1300" b="1" i="0" u="none" strike="noStrike" kern="1200" cap="none" baseline="0" noProof="0">
+            <a:solidFill>
+              <a:srgbClr val="010000"/>
+            </a:solidFill>
             <a:latin typeface="Times New Roman"/>
             <a:cs typeface="Times New Roman"/>
           </a:endParaRPr>
@@ -10144,7 +10083,7 @@
       </dsp:txBody>
       <dsp:txXfrm>
         <a:off x="0" y="0"/>
-        <a:ext cx="5141912" cy="337939"/>
+        <a:ext cx="5238777" cy="337939"/>
       </dsp:txXfrm>
     </dsp:sp>
     <dsp:sp modelId="{AD638F70-99CD-DD44-9255-92C28D3A272A}">
@@ -10155,7 +10094,7 @@
       <dsp:spPr>
         <a:xfrm>
           <a:off x="0" y="337939"/>
-          <a:ext cx="5141912" cy="0"/>
+          <a:ext cx="5238777" cy="0"/>
         </a:xfrm>
         <a:prstGeom prst="line">
           <a:avLst/>
@@ -10204,7 +10143,7 @@
       <dsp:spPr>
         <a:xfrm>
           <a:off x="0" y="337939"/>
-          <a:ext cx="5141912" cy="337939"/>
+          <a:ext cx="5238777" cy="337939"/>
         </a:xfrm>
         <a:prstGeom prst="rect">
           <a:avLst/>
@@ -10246,35 +10185,17 @@
             <a:buNone/>
           </a:pPr>
           <a:r>
-            <a:rPr lang="en-US" sz="1300" b="1" kern="1200" dirty="0">
+            <a:rPr lang="en-US" sz="1300" b="1" kern="1200">
               <a:latin typeface="Times New Roman"/>
               <a:cs typeface="Times New Roman"/>
             </a:rPr>
-            <a:t>Methodology – </a:t>
+            <a:t>Methodology – Leutrim Dema and Duc Than</a:t>
           </a:r>
-          <a:r>
-            <a:rPr lang="en-US" sz="1300" b="1" kern="1200" dirty="0" err="1">
-              <a:latin typeface="Times New Roman"/>
-              <a:cs typeface="Times New Roman"/>
-            </a:rPr>
-            <a:t>Leutrim</a:t>
-          </a:r>
-          <a:r>
-            <a:rPr lang="en-US" sz="1300" b="1" kern="1200" dirty="0">
-              <a:latin typeface="Times New Roman"/>
-              <a:cs typeface="Times New Roman"/>
-            </a:rPr>
-            <a:t> Dema and Duc Than</a:t>
-          </a:r>
-          <a:endParaRPr lang="en-US" sz="1300" kern="1200" dirty="0">
-            <a:latin typeface="Times New Roman"/>
-            <a:cs typeface="Times New Roman"/>
-          </a:endParaRPr>
         </a:p>
       </dsp:txBody>
       <dsp:txXfrm>
         <a:off x="0" y="337939"/>
-        <a:ext cx="5141912" cy="337939"/>
+        <a:ext cx="5238777" cy="337939"/>
       </dsp:txXfrm>
     </dsp:sp>
     <dsp:sp modelId="{7DD7E9B1-161B-8748-B5C9-DBBEA6DF6439}">
@@ -10285,7 +10206,7 @@
       <dsp:spPr>
         <a:xfrm>
           <a:off x="0" y="675878"/>
-          <a:ext cx="5141912" cy="0"/>
+          <a:ext cx="5238777" cy="0"/>
         </a:xfrm>
         <a:prstGeom prst="line">
           <a:avLst/>
@@ -10334,7 +10255,7 @@
       <dsp:spPr>
         <a:xfrm>
           <a:off x="0" y="675878"/>
-          <a:ext cx="5141912" cy="337939"/>
+          <a:ext cx="5238777" cy="337939"/>
         </a:xfrm>
         <a:prstGeom prst="rect">
           <a:avLst/>
@@ -10376,21 +10297,17 @@
             <a:buNone/>
           </a:pPr>
           <a:r>
-            <a:rPr lang="en-US" sz="1300" b="1" kern="1200" dirty="0">
+            <a:rPr lang="en-US" sz="1300" b="1" kern="1200">
               <a:latin typeface="Times New Roman"/>
               <a:cs typeface="Times New Roman"/>
             </a:rPr>
             <a:t>Value Proposition - Gabriela Aldrete and Thy Tran</a:t>
           </a:r>
-          <a:endParaRPr lang="en-US" sz="1300" kern="1200" dirty="0">
-            <a:latin typeface="Times New Roman" panose="02020603050405020304" pitchFamily="18" charset="0"/>
-            <a:cs typeface="Times New Roman" panose="02020603050405020304" pitchFamily="18" charset="0"/>
-          </a:endParaRPr>
         </a:p>
       </dsp:txBody>
       <dsp:txXfrm>
         <a:off x="0" y="675878"/>
-        <a:ext cx="5141912" cy="337939"/>
+        <a:ext cx="5238777" cy="337939"/>
       </dsp:txXfrm>
     </dsp:sp>
     <dsp:sp modelId="{481EB617-5DAA-BD43-A0BF-1D3DF52E404F}">
@@ -10401,7 +10318,7 @@
       <dsp:spPr>
         <a:xfrm>
           <a:off x="0" y="1013817"/>
-          <a:ext cx="5141912" cy="0"/>
+          <a:ext cx="5238777" cy="0"/>
         </a:xfrm>
         <a:prstGeom prst="line">
           <a:avLst/>
@@ -10450,7 +10367,7 @@
       <dsp:spPr>
         <a:xfrm>
           <a:off x="0" y="1013817"/>
-          <a:ext cx="5141912" cy="337939"/>
+          <a:ext cx="5238777" cy="337939"/>
         </a:xfrm>
         <a:prstGeom prst="rect">
           <a:avLst/>
@@ -10492,21 +10409,17 @@
             <a:buNone/>
           </a:pPr>
           <a:r>
-            <a:rPr lang="en-US" sz="1300" b="1" kern="1200" dirty="0">
-              <a:latin typeface="Times New Roman" panose="02020603050405020304" pitchFamily="18" charset="0"/>
-              <a:cs typeface="Times New Roman" panose="02020603050405020304" pitchFamily="18" charset="0"/>
+            <a:rPr lang="en-US" sz="1300" b="1" kern="1200">
+              <a:latin typeface="Times New Roman"/>
+              <a:cs typeface="Times New Roman"/>
             </a:rPr>
             <a:t>Development Milestones - 4 members</a:t>
           </a:r>
-          <a:endParaRPr lang="en-US" sz="1300" kern="1200" dirty="0">
-            <a:latin typeface="Times New Roman" panose="02020603050405020304" pitchFamily="18" charset="0"/>
-            <a:cs typeface="Times New Roman" panose="02020603050405020304" pitchFamily="18" charset="0"/>
-          </a:endParaRPr>
         </a:p>
       </dsp:txBody>
       <dsp:txXfrm>
         <a:off x="0" y="1013817"/>
-        <a:ext cx="5141912" cy="337939"/>
+        <a:ext cx="5238777" cy="337939"/>
       </dsp:txXfrm>
     </dsp:sp>
     <dsp:sp modelId="{DF915966-65BC-0546-A55B-F7C64D2DF6E3}">
@@ -10517,7 +10430,7 @@
       <dsp:spPr>
         <a:xfrm>
           <a:off x="0" y="1351756"/>
-          <a:ext cx="5141912" cy="0"/>
+          <a:ext cx="5238777" cy="0"/>
         </a:xfrm>
         <a:prstGeom prst="line">
           <a:avLst/>
@@ -10566,7 +10479,7 @@
       <dsp:spPr>
         <a:xfrm>
           <a:off x="0" y="1351756"/>
-          <a:ext cx="5141912" cy="337939"/>
+          <a:ext cx="5238777" cy="337939"/>
         </a:xfrm>
         <a:prstGeom prst="rect">
           <a:avLst/>
@@ -10608,17 +10521,17 @@
             <a:buNone/>
           </a:pPr>
           <a:r>
-            <a:rPr lang="en-US" sz="1300" kern="1200" dirty="0">
+            <a:rPr lang="en-US" sz="1300" b="1" kern="1200">
               <a:latin typeface="Times New Roman"/>
               <a:cs typeface="Times New Roman"/>
             </a:rPr>
-            <a:t>Background -  Thy Tran and Duck Than</a:t>
+            <a:t>Background -  Thy Tran and Duc Than</a:t>
           </a:r>
         </a:p>
       </dsp:txBody>
       <dsp:txXfrm>
         <a:off x="0" y="1351756"/>
-        <a:ext cx="5141912" cy="337939"/>
+        <a:ext cx="5238777" cy="337939"/>
       </dsp:txXfrm>
     </dsp:sp>
     <dsp:sp modelId="{D01D82F9-1B48-F042-AB50-2BBA57C99E87}">
@@ -10629,7 +10542,7 @@
       <dsp:spPr>
         <a:xfrm>
           <a:off x="0" y="1689695"/>
-          <a:ext cx="5141912" cy="0"/>
+          <a:ext cx="5238777" cy="0"/>
         </a:xfrm>
         <a:prstGeom prst="line">
           <a:avLst/>
@@ -10678,7 +10591,7 @@
       <dsp:spPr>
         <a:xfrm>
           <a:off x="0" y="1689695"/>
-          <a:ext cx="5141912" cy="337939"/>
+          <a:ext cx="5238777" cy="337939"/>
         </a:xfrm>
         <a:prstGeom prst="rect">
           <a:avLst/>
@@ -10720,9 +10633,9 @@
             <a:buNone/>
           </a:pPr>
           <a:r>
-            <a:rPr lang="en-US" sz="1300" kern="1200" dirty="0">
-              <a:latin typeface="Times New Roman" panose="02020603050405020304" pitchFamily="18" charset="0"/>
-              <a:cs typeface="Times New Roman" panose="02020603050405020304" pitchFamily="18" charset="0"/>
+            <a:rPr lang="en-US" sz="1300" b="1" kern="1200">
+              <a:latin typeface="Times New Roman"/>
+              <a:cs typeface="Times New Roman"/>
             </a:rPr>
             <a:t>Related Work -Thy Tran</a:t>
           </a:r>
@@ -10730,7 +10643,7 @@
       </dsp:txBody>
       <dsp:txXfrm>
         <a:off x="0" y="1689695"/>
-        <a:ext cx="5141912" cy="337939"/>
+        <a:ext cx="5238777" cy="337939"/>
       </dsp:txXfrm>
     </dsp:sp>
     <dsp:sp modelId="{B53FF99C-612E-6544-BFD9-F8F7CB0F264D}">
@@ -10741,7 +10654,7 @@
       <dsp:spPr>
         <a:xfrm>
           <a:off x="0" y="2027634"/>
-          <a:ext cx="5141912" cy="0"/>
+          <a:ext cx="5238777" cy="0"/>
         </a:xfrm>
         <a:prstGeom prst="line">
           <a:avLst/>
@@ -10790,7 +10703,7 @@
       <dsp:spPr>
         <a:xfrm>
           <a:off x="0" y="2027634"/>
-          <a:ext cx="5141912" cy="337939"/>
+          <a:ext cx="5238777" cy="337939"/>
         </a:xfrm>
         <a:prstGeom prst="rect">
           <a:avLst/>
@@ -10832,7 +10745,7 @@
             <a:buNone/>
           </a:pPr>
           <a:r>
-            <a:rPr lang="en-US" sz="1300" kern="1200" dirty="0">
+            <a:rPr lang="en-US" sz="1300" b="1" kern="1200">
               <a:latin typeface="Times New Roman"/>
               <a:cs typeface="Times New Roman"/>
             </a:rPr>
@@ -10842,7 +10755,7 @@
       </dsp:txBody>
       <dsp:txXfrm>
         <a:off x="0" y="2027634"/>
-        <a:ext cx="5141912" cy="337939"/>
+        <a:ext cx="5238777" cy="337939"/>
       </dsp:txXfrm>
     </dsp:sp>
     <dsp:sp modelId="{C82E707A-1B30-A34F-BA6B-848A3CA1E64F}">
@@ -10853,7 +10766,7 @@
       <dsp:spPr>
         <a:xfrm>
           <a:off x="0" y="2365573"/>
-          <a:ext cx="5141912" cy="0"/>
+          <a:ext cx="5238777" cy="0"/>
         </a:xfrm>
         <a:prstGeom prst="line">
           <a:avLst/>
@@ -10902,7 +10815,7 @@
       <dsp:spPr>
         <a:xfrm>
           <a:off x="0" y="2365573"/>
-          <a:ext cx="5141912" cy="337939"/>
+          <a:ext cx="5238777" cy="337939"/>
         </a:xfrm>
         <a:prstGeom prst="rect">
           <a:avLst/>
@@ -10931,7 +10844,7 @@
         </a:bodyPr>
         <a:lstStyle/>
         <a:p>
-          <a:pPr marL="0" lvl="0" indent="0" algn="l" defTabSz="577850">
+          <a:pPr marL="0" lvl="0" indent="0" algn="l" defTabSz="577850" rtl="0">
             <a:lnSpc>
               <a:spcPct val="90000"/>
             </a:lnSpc>
@@ -10944,17 +10857,17 @@
             <a:buNone/>
           </a:pPr>
           <a:r>
-            <a:rPr lang="en-US" sz="1300" kern="1200" dirty="0">
-              <a:latin typeface="Times New Roman" panose="02020603050405020304" pitchFamily="18" charset="0"/>
-              <a:cs typeface="Times New Roman" panose="02020603050405020304" pitchFamily="18" charset="0"/>
+            <a:rPr lang="en-US" sz="1300" b="1" kern="1200">
+              <a:latin typeface="Times New Roman"/>
+              <a:cs typeface="Times New Roman"/>
             </a:rPr>
-            <a:t>Roles and Responsibilities  - 4 members</a:t>
+            <a:t>Roles and Responsibilities  - 4 members</a:t>
           </a:r>
         </a:p>
       </dsp:txBody>
       <dsp:txXfrm>
         <a:off x="0" y="2365573"/>
-        <a:ext cx="5141912" cy="337939"/>
+        <a:ext cx="5238777" cy="337939"/>
       </dsp:txXfrm>
     </dsp:sp>
     <dsp:sp modelId="{8DC545D9-B78B-9044-98E0-865316653E7F}">
@@ -10965,7 +10878,7 @@
       <dsp:spPr>
         <a:xfrm>
           <a:off x="0" y="2703512"/>
-          <a:ext cx="5141912" cy="0"/>
+          <a:ext cx="5238777" cy="0"/>
         </a:xfrm>
         <a:prstGeom prst="line">
           <a:avLst/>
@@ -11014,7 +10927,7 @@
       <dsp:spPr>
         <a:xfrm>
           <a:off x="0" y="2703512"/>
-          <a:ext cx="5141912" cy="337939"/>
+          <a:ext cx="5238777" cy="337939"/>
         </a:xfrm>
         <a:prstGeom prst="rect">
           <a:avLst/>
@@ -11056,7 +10969,7 @@
             <a:buNone/>
           </a:pPr>
           <a:r>
-            <a:rPr lang="en-US" sz="1300" kern="1200" dirty="0">
+            <a:rPr lang="en-US" sz="1300" b="1" kern="1200">
               <a:latin typeface="Times New Roman"/>
               <a:cs typeface="Times New Roman"/>
             </a:rPr>
@@ -11066,7 +10979,7 @@
       </dsp:txBody>
       <dsp:txXfrm>
         <a:off x="0" y="2703512"/>
-        <a:ext cx="5141912" cy="337939"/>
+        <a:ext cx="5238777" cy="337939"/>
       </dsp:txXfrm>
     </dsp:sp>
     <dsp:sp modelId="{3E9E8503-5510-2646-97AD-A69159D71DD8}">
@@ -11077,7 +10990,7 @@
       <dsp:spPr>
         <a:xfrm>
           <a:off x="0" y="3041451"/>
-          <a:ext cx="5141912" cy="0"/>
+          <a:ext cx="5238777" cy="0"/>
         </a:xfrm>
         <a:prstGeom prst="line">
           <a:avLst/>
@@ -11126,7 +11039,7 @@
       <dsp:spPr>
         <a:xfrm>
           <a:off x="0" y="3041451"/>
-          <a:ext cx="5141912" cy="337939"/>
+          <a:ext cx="5238777" cy="337939"/>
         </a:xfrm>
         <a:prstGeom prst="rect">
           <a:avLst/>
@@ -11168,31 +11081,17 @@
             <a:buNone/>
           </a:pPr>
           <a:r>
-            <a:rPr lang="en-US" sz="1300" kern="1200" dirty="0">
+            <a:rPr lang="en-US" sz="1300" b="1" kern="1200">
               <a:latin typeface="Times New Roman"/>
               <a:cs typeface="Times New Roman"/>
             </a:rPr>
-            <a:t>Facilities &amp; Equipment - </a:t>
-          </a:r>
-          <a:r>
-            <a:rPr lang="en-US" sz="1300" kern="1200" dirty="0" err="1">
-              <a:latin typeface="Times New Roman"/>
-              <a:cs typeface="Times New Roman"/>
-            </a:rPr>
-            <a:t>Leutrim</a:t>
-          </a:r>
-          <a:r>
-            <a:rPr lang="en-US" sz="1300" kern="1200" dirty="0">
-              <a:latin typeface="Times New Roman"/>
-              <a:cs typeface="Times New Roman"/>
-            </a:rPr>
-            <a:t> Dema</a:t>
+            <a:t>Facilities &amp; Equipment - Leutrim Dema</a:t>
           </a:r>
         </a:p>
       </dsp:txBody>
       <dsp:txXfrm>
         <a:off x="0" y="3041451"/>
-        <a:ext cx="5141912" cy="337939"/>
+        <a:ext cx="5238777" cy="337939"/>
       </dsp:txXfrm>
     </dsp:sp>
     <dsp:sp modelId="{3480A30F-D36B-6E4F-BF5D-B2DB94E9C60D}">
@@ -11203,7 +11102,7 @@
       <dsp:spPr>
         <a:xfrm>
           <a:off x="0" y="3379390"/>
-          <a:ext cx="5141912" cy="0"/>
+          <a:ext cx="5238777" cy="0"/>
         </a:xfrm>
         <a:prstGeom prst="line">
           <a:avLst/>
@@ -11252,7 +11151,7 @@
       <dsp:spPr>
         <a:xfrm>
           <a:off x="0" y="3379390"/>
-          <a:ext cx="5141912" cy="337939"/>
+          <a:ext cx="5238777" cy="337939"/>
         </a:xfrm>
         <a:prstGeom prst="rect">
           <a:avLst/>
@@ -11294,9 +11193,9 @@
             <a:buNone/>
           </a:pPr>
           <a:r>
-            <a:rPr lang="en-US" sz="1300" kern="1200" dirty="0">
-              <a:latin typeface="Times New Roman" panose="02020603050405020304" pitchFamily="18" charset="0"/>
-              <a:cs typeface="Times New Roman" panose="02020603050405020304" pitchFamily="18" charset="0"/>
+            <a:rPr lang="en-US" sz="1300" b="1" kern="1200">
+              <a:latin typeface="Times New Roman"/>
+              <a:cs typeface="Times New Roman"/>
             </a:rPr>
             <a:t>Assumptions - Duc Than</a:t>
           </a:r>
@@ -11304,7 +11203,7 @@
       </dsp:txBody>
       <dsp:txXfrm>
         <a:off x="0" y="3379390"/>
-        <a:ext cx="5141912" cy="337939"/>
+        <a:ext cx="5238777" cy="337939"/>
       </dsp:txXfrm>
     </dsp:sp>
     <dsp:sp modelId="{6F355221-CA64-3E49-A7A9-974F1CBA7C9B}">
@@ -11315,7 +11214,7 @@
       <dsp:spPr>
         <a:xfrm>
           <a:off x="0" y="3717329"/>
-          <a:ext cx="5141912" cy="0"/>
+          <a:ext cx="5238777" cy="0"/>
         </a:xfrm>
         <a:prstGeom prst="line">
           <a:avLst/>
@@ -11364,7 +11263,7 @@
       <dsp:spPr>
         <a:xfrm>
           <a:off x="0" y="3717329"/>
-          <a:ext cx="5141912" cy="337939"/>
+          <a:ext cx="5238777" cy="337939"/>
         </a:xfrm>
         <a:prstGeom prst="rect">
           <a:avLst/>
@@ -11406,31 +11305,17 @@
             <a:buNone/>
           </a:pPr>
           <a:r>
-            <a:rPr lang="en-US" sz="1300" kern="1200" dirty="0">
+            <a:rPr lang="en-US" sz="1300" b="1" kern="1200">
               <a:latin typeface="Times New Roman"/>
               <a:cs typeface="Times New Roman"/>
             </a:rPr>
-            <a:t>Constraints - </a:t>
-          </a:r>
-          <a:r>
-            <a:rPr lang="en-US" sz="1300" kern="1200" dirty="0" err="1">
-              <a:latin typeface="Times New Roman"/>
-              <a:cs typeface="Times New Roman"/>
-            </a:rPr>
-            <a:t>Bigyan</a:t>
-          </a:r>
-          <a:r>
-            <a:rPr lang="en-US" sz="1300" kern="1200" dirty="0">
-              <a:latin typeface="Times New Roman"/>
-              <a:cs typeface="Times New Roman"/>
-            </a:rPr>
-            <a:t> Adhikari</a:t>
+            <a:t>Constraints - Bigyan Adhikari</a:t>
           </a:r>
         </a:p>
       </dsp:txBody>
       <dsp:txXfrm>
         <a:off x="0" y="3717329"/>
-        <a:ext cx="5141912" cy="337939"/>
+        <a:ext cx="5238777" cy="337939"/>
       </dsp:txXfrm>
     </dsp:sp>
     <dsp:sp modelId="{FD67922A-0BBC-3749-8819-6F8EA1FD54CD}">
@@ -11441,7 +11326,7 @@
       <dsp:spPr>
         <a:xfrm>
           <a:off x="0" y="4055268"/>
-          <a:ext cx="5141912" cy="0"/>
+          <a:ext cx="5238777" cy="0"/>
         </a:xfrm>
         <a:prstGeom prst="line">
           <a:avLst/>
@@ -11490,7 +11375,7 @@
       <dsp:spPr>
         <a:xfrm>
           <a:off x="0" y="4055268"/>
-          <a:ext cx="5141912" cy="337939"/>
+          <a:ext cx="5238777" cy="337939"/>
         </a:xfrm>
         <a:prstGeom prst="rect">
           <a:avLst/>
@@ -11532,7 +11417,7 @@
             <a:buNone/>
           </a:pPr>
           <a:r>
-            <a:rPr lang="en-US" sz="1300" kern="1200" dirty="0">
+            <a:rPr lang="en-US" sz="1300" b="1" kern="1200">
               <a:latin typeface="Times New Roman"/>
               <a:cs typeface="Times New Roman"/>
             </a:rPr>
@@ -11542,7 +11427,7 @@
       </dsp:txBody>
       <dsp:txXfrm>
         <a:off x="0" y="4055268"/>
-        <a:ext cx="5141912" cy="337939"/>
+        <a:ext cx="5238777" cy="337939"/>
       </dsp:txXfrm>
     </dsp:sp>
     <dsp:sp modelId="{AADEAC2E-8CB1-1B4A-B868-ACD162F75A46}">
@@ -11553,7 +11438,7 @@
       <dsp:spPr>
         <a:xfrm>
           <a:off x="0" y="4393207"/>
-          <a:ext cx="5141912" cy="0"/>
+          <a:ext cx="5238777" cy="0"/>
         </a:xfrm>
         <a:prstGeom prst="line">
           <a:avLst/>
@@ -11602,7 +11487,7 @@
       <dsp:spPr>
         <a:xfrm>
           <a:off x="0" y="4393207"/>
-          <a:ext cx="5141912" cy="337939"/>
+          <a:ext cx="5238777" cy="337939"/>
         </a:xfrm>
         <a:prstGeom prst="rect">
           <a:avLst/>
@@ -11644,21 +11529,21 @@
             <a:buNone/>
           </a:pPr>
           <a:r>
-            <a:rPr lang="en-US" sz="1300" kern="1200" dirty="0">
+            <a:rPr lang="en-US" sz="1300" b="1" kern="1200" dirty="0">
               <a:latin typeface="Times New Roman"/>
               <a:cs typeface="Times New Roman"/>
             </a:rPr>
-            <a:t>14.1 Major Documentation Deliverables - </a:t>
+            <a:t>Major Documentation Deliverables - </a:t>
           </a:r>
           <a:r>
-            <a:rPr lang="en-US" sz="1300" kern="1200" dirty="0" err="1">
+            <a:rPr lang="en-US" sz="1300" b="1" kern="1200" dirty="0" err="1">
               <a:latin typeface="Times New Roman"/>
               <a:cs typeface="Times New Roman"/>
             </a:rPr>
             <a:t>Bigyan</a:t>
           </a:r>
           <a:r>
-            <a:rPr lang="en-US" sz="1300" kern="1200" dirty="0">
+            <a:rPr lang="en-US" sz="1300" b="1" kern="1200" dirty="0">
               <a:latin typeface="Times New Roman"/>
               <a:cs typeface="Times New Roman"/>
             </a:rPr>
@@ -11668,7 +11553,7 @@
       </dsp:txBody>
       <dsp:txXfrm>
         <a:off x="0" y="4393207"/>
-        <a:ext cx="5141912" cy="337939"/>
+        <a:ext cx="5238777" cy="337939"/>
       </dsp:txXfrm>
     </dsp:sp>
     <dsp:sp modelId="{6E7A0128-FC76-2848-A51C-3FECD83A6B67}">
@@ -11679,7 +11564,7 @@
       <dsp:spPr>
         <a:xfrm>
           <a:off x="0" y="4731146"/>
-          <a:ext cx="5141912" cy="0"/>
+          <a:ext cx="5238777" cy="0"/>
         </a:xfrm>
         <a:prstGeom prst="line">
           <a:avLst/>
@@ -11728,7 +11613,7 @@
       <dsp:spPr>
         <a:xfrm>
           <a:off x="0" y="4731146"/>
-          <a:ext cx="5141912" cy="337939"/>
+          <a:ext cx="5238777" cy="337939"/>
         </a:xfrm>
         <a:prstGeom prst="rect">
           <a:avLst/>
@@ -11770,21 +11655,21 @@
             <a:buNone/>
           </a:pPr>
           <a:r>
-            <a:rPr lang="en-US" sz="1300" kern="1200" dirty="0">
+            <a:rPr lang="en-US" sz="1300" b="1" kern="1200" dirty="0">
               <a:latin typeface="Times New Roman"/>
               <a:cs typeface="Times New Roman"/>
             </a:rPr>
-            <a:t>14.2 Recurring Sprint Items - </a:t>
+            <a:t>Recurring Sprint Items - </a:t>
           </a:r>
           <a:r>
-            <a:rPr lang="en-US" sz="1300" kern="1200" dirty="0" err="1">
+            <a:rPr lang="en-US" sz="1300" b="1" kern="1200" dirty="0" err="1">
               <a:latin typeface="Times New Roman"/>
               <a:cs typeface="Times New Roman"/>
             </a:rPr>
             <a:t>Leutrim</a:t>
           </a:r>
           <a:r>
-            <a:rPr lang="en-US" sz="1300" kern="1200" dirty="0">
+            <a:rPr lang="en-US" sz="1300" b="1" kern="1200" dirty="0">
               <a:latin typeface="Times New Roman"/>
               <a:cs typeface="Times New Roman"/>
             </a:rPr>
@@ -11794,7 +11679,7 @@
       </dsp:txBody>
       <dsp:txXfrm>
         <a:off x="0" y="4731146"/>
-        <a:ext cx="5141912" cy="337939"/>
+        <a:ext cx="5238777" cy="337939"/>
       </dsp:txXfrm>
     </dsp:sp>
     <dsp:sp modelId="{FF31EE75-8B38-3E40-9C7B-505948029C6C}">
@@ -11805,7 +11690,7 @@
       <dsp:spPr>
         <a:xfrm>
           <a:off x="0" y="5069085"/>
-          <a:ext cx="5141912" cy="0"/>
+          <a:ext cx="5238777" cy="0"/>
         </a:xfrm>
         <a:prstGeom prst="line">
           <a:avLst/>
@@ -11854,7 +11739,7 @@
       <dsp:spPr>
         <a:xfrm>
           <a:off x="0" y="5069085"/>
-          <a:ext cx="5141912" cy="337939"/>
+          <a:ext cx="5238777" cy="337939"/>
         </a:xfrm>
         <a:prstGeom prst="rect">
           <a:avLst/>
@@ -11896,17 +11781,31 @@
             <a:buNone/>
           </a:pPr>
           <a:r>
-            <a:rPr lang="en-US" sz="1300" kern="1200" dirty="0">
+            <a:rPr lang="en-US" sz="1300" b="1" kern="1200" dirty="0">
               <a:latin typeface="Times New Roman"/>
               <a:cs typeface="Times New Roman"/>
             </a:rPr>
-            <a:t>14.3 Closeout Materials – Gabriela Aldrete and Leutrim Dema</a:t>
+            <a:t>Closeout Materials – Gabriela Aldrete and </a:t>
+          </a:r>
+          <a:r>
+            <a:rPr lang="en-US" sz="1300" b="1" kern="1200" dirty="0" err="1">
+              <a:latin typeface="Times New Roman"/>
+              <a:cs typeface="Times New Roman"/>
+            </a:rPr>
+            <a:t>Leutrim</a:t>
+          </a:r>
+          <a:r>
+            <a:rPr lang="en-US" sz="1300" b="1" kern="1200" dirty="0">
+              <a:latin typeface="Times New Roman"/>
+              <a:cs typeface="Times New Roman"/>
+            </a:rPr>
+            <a:t> Dema</a:t>
           </a:r>
         </a:p>
       </dsp:txBody>
       <dsp:txXfrm>
         <a:off x="0" y="5069085"/>
-        <a:ext cx="5141912" cy="337939"/>
+        <a:ext cx="5238777" cy="337939"/>
       </dsp:txXfrm>
     </dsp:sp>
   </dsp:spTree>
@@ -12062,12 +11961,19 @@
             <a:buNone/>
           </a:pPr>
           <a:r>
-            <a:rPr lang="en-US" sz="2400" b="0" i="0" u="none" strike="noStrike" kern="1200" cap="none" baseline="0" noProof="0" dirty="0">
+            <a:rPr lang="en-US" sz="2400" b="1" i="0" u="none" strike="noStrike" kern="1200" cap="none" baseline="0" noProof="0">
               <a:latin typeface="Times New Roman"/>
               <a:cs typeface="Times New Roman"/>
             </a:rPr>
             <a:t>SCRUM MASTER: Leutrim Dema</a:t>
           </a:r>
+          <a:endParaRPr lang="en-US" sz="2400" b="1" i="0" u="none" strike="noStrike" kern="1200" cap="none" baseline="0" noProof="0">
+            <a:solidFill>
+              <a:srgbClr val="010000"/>
+            </a:solidFill>
+            <a:latin typeface="Times New Roman"/>
+            <a:cs typeface="Times New Roman"/>
+          </a:endParaRPr>
         </a:p>
       </dsp:txBody>
       <dsp:txXfrm>
@@ -12216,18 +12122,14 @@
             <a:buNone/>
           </a:pPr>
           <a:r>
-            <a:rPr lang="en-US" sz="2300" kern="1200" dirty="0">
+            <a:rPr lang="en-US" sz="2300" b="1" kern="1200">
               <a:latin typeface="Times New Roman"/>
               <a:cs typeface="Times New Roman"/>
             </a:rPr>
             <a:t>BUSINESS PLANNER: Gabriela Aldrete  </a:t>
           </a:r>
-          <a:r>
-            <a:rPr lang="en-US" kern="1200" dirty="0"/>
-            <a:t> </a:t>
-          </a:r>
-          <a:endParaRPr lang="en-US" sz="2300" kern="1200" dirty="0">
-            <a:latin typeface="Times New Roman"/>
+          <a:endParaRPr lang="en-US" sz="2300" b="1" kern="1200">
+            <a:latin typeface="Rockwell Condensed"/>
             <a:cs typeface="Times New Roman"/>
           </a:endParaRPr>
         </a:p>
@@ -12322,7 +12224,7 @@
             </a:rPr>
             <a:t>Problem Statement - 4hrs</a:t>
           </a:r>
-          <a:endParaRPr lang="en-US" sz="1600" kern="1200"/>
+          <a:endParaRPr lang="en-US" sz="1600" b="1" kern="1200"/>
         </a:p>
       </dsp:txBody>
       <dsp:txXfrm>
@@ -12397,7 +12299,7 @@
             <a:buNone/>
           </a:pPr>
           <a:r>
-            <a:rPr lang="en-US" sz="1600" b="1" kern="1200" dirty="0">
+            <a:rPr lang="en-US" sz="1600" b="1" kern="1200">
               <a:latin typeface="Times New Roman"/>
               <a:cs typeface="Times New Roman"/>
             </a:rPr>
@@ -12477,16 +12379,12 @@
             <a:buNone/>
           </a:pPr>
           <a:r>
-            <a:rPr lang="en-US" sz="1600" b="1" kern="1200" dirty="0">
+            <a:rPr lang="en-US" sz="1600" b="1" kern="1200">
               <a:latin typeface="Times New Roman"/>
               <a:cs typeface="Times New Roman"/>
             </a:rPr>
             <a:t>Value Proposition - 4hrs</a:t>
           </a:r>
-          <a:endParaRPr lang="en-US" sz="1600" kern="1200" dirty="0">
-            <a:latin typeface="Times New Roman" panose="02020603050405020304" pitchFamily="18" charset="0"/>
-            <a:cs typeface="Times New Roman" panose="02020603050405020304" pitchFamily="18" charset="0"/>
-          </a:endParaRPr>
         </a:p>
       </dsp:txBody>
       <dsp:txXfrm>
@@ -12561,16 +12459,12 @@
             <a:buNone/>
           </a:pPr>
           <a:r>
-            <a:rPr lang="en-US" sz="1600" b="1" kern="1200" dirty="0">
+            <a:rPr lang="en-US" sz="1600" b="1" kern="1200">
               <a:latin typeface="Times New Roman"/>
               <a:cs typeface="Times New Roman"/>
             </a:rPr>
             <a:t>Development Milestones - 6hrs</a:t>
           </a:r>
-          <a:endParaRPr lang="en-US" sz="1600" kern="1200" dirty="0">
-            <a:latin typeface="Times New Roman" panose="02020603050405020304" pitchFamily="18" charset="0"/>
-            <a:cs typeface="Times New Roman" panose="02020603050405020304" pitchFamily="18" charset="0"/>
-          </a:endParaRPr>
         </a:p>
       </dsp:txBody>
       <dsp:txXfrm>
@@ -12645,7 +12539,7 @@
             <a:buNone/>
           </a:pPr>
           <a:r>
-            <a:rPr lang="en-US" sz="1600" kern="1200" dirty="0">
+            <a:rPr lang="en-US" sz="1600" b="1" kern="1200">
               <a:latin typeface="Times New Roman"/>
               <a:cs typeface="Times New Roman"/>
             </a:rPr>
@@ -12725,7 +12619,7 @@
             <a:buNone/>
           </a:pPr>
           <a:r>
-            <a:rPr lang="en-US" sz="1600" kern="1200" dirty="0">
+            <a:rPr lang="en-US" sz="1600" b="1" kern="1200">
               <a:latin typeface="Times New Roman"/>
               <a:cs typeface="Times New Roman"/>
             </a:rPr>
@@ -12805,7 +12699,7 @@
             <a:buNone/>
           </a:pPr>
           <a:r>
-            <a:rPr lang="en-US" sz="1600" kern="1200" dirty="0">
+            <a:rPr lang="en-US" sz="1600" b="1" kern="1200">
               <a:latin typeface="Times New Roman"/>
               <a:cs typeface="Times New Roman"/>
             </a:rPr>
@@ -12885,7 +12779,7 @@
             <a:buNone/>
           </a:pPr>
           <a:r>
-            <a:rPr lang="en-US" sz="1600" kern="1200" dirty="0">
+            <a:rPr lang="en-US" sz="1600" b="1" kern="1200">
               <a:latin typeface="Times New Roman"/>
               <a:cs typeface="Times New Roman"/>
             </a:rPr>
@@ -12965,7 +12859,7 @@
             <a:buNone/>
           </a:pPr>
           <a:r>
-            <a:rPr lang="en-US" sz="1600" kern="1200" dirty="0">
+            <a:rPr lang="en-US" sz="1600" b="1" kern="1200">
               <a:latin typeface="Times New Roman"/>
               <a:cs typeface="Times New Roman"/>
             </a:rPr>
@@ -13045,7 +12939,7 @@
             <a:buNone/>
           </a:pPr>
           <a:r>
-            <a:rPr lang="en-US" sz="1600" kern="1200" dirty="0">
+            <a:rPr lang="en-US" sz="1600" b="1" kern="1200">
               <a:latin typeface="Times New Roman"/>
               <a:cs typeface="Times New Roman"/>
             </a:rPr>
@@ -13125,7 +13019,7 @@
             <a:buNone/>
           </a:pPr>
           <a:r>
-            <a:rPr lang="en-US" sz="1600" kern="1200" dirty="0">
+            <a:rPr lang="en-US" sz="1600" b="1" kern="1200">
               <a:latin typeface="Times New Roman"/>
               <a:cs typeface="Times New Roman"/>
             </a:rPr>
@@ -13205,7 +13099,7 @@
             <a:buNone/>
           </a:pPr>
           <a:r>
-            <a:rPr lang="en-US" sz="1600" kern="1200" dirty="0">
+            <a:rPr lang="en-US" sz="1600" b="1" kern="1200">
               <a:latin typeface="Times New Roman"/>
               <a:cs typeface="Times New Roman"/>
             </a:rPr>
@@ -13285,7 +13179,7 @@
             <a:buNone/>
           </a:pPr>
           <a:r>
-            <a:rPr lang="en-US" sz="1600" kern="1200" dirty="0">
+            <a:rPr lang="en-US" sz="1600" b="1" kern="1200">
               <a:latin typeface="Times New Roman"/>
               <a:cs typeface="Times New Roman"/>
             </a:rPr>
@@ -13365,7 +13259,7 @@
             <a:buNone/>
           </a:pPr>
           <a:r>
-            <a:rPr lang="en-US" sz="1600" kern="1200" dirty="0">
+            <a:rPr lang="en-US" sz="1600" b="1" kern="1200">
               <a:latin typeface="Times New Roman"/>
               <a:cs typeface="Times New Roman"/>
             </a:rPr>
@@ -13445,7 +13339,7 @@
             <a:buNone/>
           </a:pPr>
           <a:r>
-            <a:rPr lang="en-US" sz="1600" kern="1200" dirty="0">
+            <a:rPr lang="en-US" sz="1600" b="1" kern="1200">
               <a:latin typeface="Times New Roman"/>
               <a:cs typeface="Times New Roman"/>
             </a:rPr>
@@ -20373,7 +20267,7 @@
           <a:bodyPr/>
           <a:lstStyle/>
           <a:p>
-            <a:endParaRPr lang="en-US" dirty="0"/>
+            <a:endParaRPr lang="en-US"/>
           </a:p>
         </p:txBody>
       </p:sp>
@@ -20457,7 +20351,7 @@
           <a:bodyPr/>
           <a:lstStyle/>
           <a:p>
-            <a:endParaRPr lang="en-US" dirty="0"/>
+            <a:endParaRPr lang="en-US"/>
           </a:p>
         </p:txBody>
       </p:sp>
@@ -20788,7 +20682,7 @@
                 <a:tabLst/>
                 <a:defRPr/>
               </a:pPr>
-              <a:endParaRPr kumimoji="0" lang="en-US" sz="2000" b="0" i="0" u="none" strike="noStrike" kern="0" cap="none" spc="0" normalizeH="0" baseline="0" noProof="0" dirty="0">
+              <a:endParaRPr kumimoji="0" lang="en-US" sz="2000" b="0" i="0" u="none" strike="noStrike" kern="0" cap="none" spc="0" normalizeH="0" baseline="0" noProof="0">
                 <a:ln>
                   <a:noFill/>
                 </a:ln>
@@ -20849,7 +20743,7 @@
                 <a:tabLst/>
                 <a:defRPr/>
               </a:pPr>
-              <a:endParaRPr kumimoji="0" lang="en-US" sz="1800" b="0" i="0" u="none" strike="noStrike" kern="0" cap="none" spc="0" normalizeH="0" baseline="0" noProof="0" dirty="0">
+              <a:endParaRPr kumimoji="0" lang="en-US" sz="1800" b="0" i="0" u="none" strike="noStrike" kern="0" cap="none" spc="0" normalizeH="0" baseline="0" noProof="0">
                 <a:ln>
                   <a:noFill/>
                 </a:ln>
@@ -20906,7 +20800,6 @@
               <a:rPr lang="en-US"/>
               <a:t>Click to edit Master title style</a:t>
             </a:r>
-            <a:endParaRPr lang="en-US" dirty="0"/>
           </a:p>
         </p:txBody>
       </p:sp>
@@ -20977,7 +20870,6 @@
               <a:rPr lang="en-US"/>
               <a:t>Click to edit Master subtitle style</a:t>
             </a:r>
-            <a:endParaRPr lang="en-US" dirty="0"/>
           </a:p>
         </p:txBody>
       </p:sp>
@@ -21277,7 +21169,6 @@
               <a:rPr lang="en-US"/>
               <a:t>Click to edit Master title style</a:t>
             </a:r>
-            <a:endParaRPr lang="en-US" dirty="0"/>
           </a:p>
         </p:txBody>
       </p:sp>
@@ -21334,7 +21225,6 @@
               <a:rPr lang="en-US"/>
               <a:t>Fifth level</a:t>
             </a:r>
-            <a:endParaRPr lang="en-US" dirty="0"/>
           </a:p>
         </p:txBody>
       </p:sp>
@@ -21452,7 +21342,6 @@
               <a:rPr lang="en-US"/>
               <a:t>Click to edit Master title style</a:t>
             </a:r>
-            <a:endParaRPr lang="en-US" dirty="0"/>
           </a:p>
         </p:txBody>
       </p:sp>
@@ -21504,7 +21393,6 @@
               <a:rPr lang="en-US"/>
               <a:t>Fifth level</a:t>
             </a:r>
-            <a:endParaRPr lang="en-US" dirty="0"/>
           </a:p>
         </p:txBody>
       </p:sp>
@@ -21701,7 +21589,6 @@
               <a:rPr lang="en-US"/>
               <a:t>Click to edit Master title style</a:t>
             </a:r>
-            <a:endParaRPr lang="en-US" dirty="0"/>
           </a:p>
         </p:txBody>
       </p:sp>
@@ -21955,7 +21842,7 @@
                 <a:tabLst/>
                 <a:defRPr/>
               </a:pPr>
-              <a:endParaRPr kumimoji="0" lang="en-US" sz="2000" b="0" i="0" u="none" strike="noStrike" kern="0" cap="none" spc="0" normalizeH="0" baseline="0" noProof="0" dirty="0">
+              <a:endParaRPr kumimoji="0" lang="en-US" sz="2000" b="0" i="0" u="none" strike="noStrike" kern="0" cap="none" spc="0" normalizeH="0" baseline="0" noProof="0">
                 <a:ln>
                   <a:noFill/>
                 </a:ln>
@@ -22016,7 +21903,7 @@
                 <a:tabLst/>
                 <a:defRPr/>
               </a:pPr>
-              <a:endParaRPr kumimoji="0" lang="en-US" sz="1800" b="0" i="0" u="none" strike="noStrike" kern="0" cap="none" spc="0" normalizeH="0" baseline="0" noProof="0" dirty="0">
+              <a:endParaRPr kumimoji="0" lang="en-US" sz="1800" b="0" i="0" u="none" strike="noStrike" kern="0" cap="none" spc="0" normalizeH="0" baseline="0" noProof="0">
                 <a:ln>
                   <a:noFill/>
                 </a:ln>
@@ -22115,7 +22002,6 @@
               <a:rPr lang="en-US"/>
               <a:t>Click to edit Master title style</a:t>
             </a:r>
-            <a:endParaRPr lang="en-US" dirty="0"/>
           </a:p>
         </p:txBody>
       </p:sp>
@@ -22200,7 +22086,6 @@
               <a:rPr lang="en-US"/>
               <a:t>Fifth level</a:t>
             </a:r>
-            <a:endParaRPr lang="en-US" dirty="0"/>
           </a:p>
         </p:txBody>
       </p:sp>
@@ -22285,7 +22170,6 @@
               <a:rPr lang="en-US"/>
               <a:t>Fifth level</a:t>
             </a:r>
-            <a:endParaRPr lang="en-US" dirty="0"/>
           </a:p>
         </p:txBody>
       </p:sp>
@@ -22538,7 +22422,6 @@
               <a:rPr lang="en-US"/>
               <a:t>Fifth level</a:t>
             </a:r>
-            <a:endParaRPr lang="en-US" dirty="0"/>
           </a:p>
         </p:txBody>
       </p:sp>
@@ -22696,7 +22579,6 @@
               <a:rPr lang="en-US"/>
               <a:t>Fifth level</a:t>
             </a:r>
-            <a:endParaRPr lang="en-US" dirty="0"/>
           </a:p>
         </p:txBody>
       </p:sp>
@@ -22784,7 +22666,6 @@
               <a:rPr lang="en-US"/>
               <a:t>Click to edit Master title style</a:t>
             </a:r>
-            <a:endParaRPr lang="en-US" dirty="0"/>
           </a:p>
         </p:txBody>
       </p:sp>
@@ -23125,7 +23006,6 @@
               <a:rPr lang="en-US"/>
               <a:t>Click to edit Master title style</a:t>
             </a:r>
-            <a:endParaRPr lang="en-US" dirty="0"/>
           </a:p>
         </p:txBody>
       </p:sp>
@@ -23210,7 +23090,6 @@
               <a:rPr lang="en-US"/>
               <a:t>Fifth level</a:t>
             </a:r>
-            <a:endParaRPr lang="en-US" dirty="0"/>
           </a:p>
         </p:txBody>
       </p:sp>
@@ -23419,7 +23298,7 @@
                 <a:tabLst/>
                 <a:defRPr/>
               </a:pPr>
-              <a:endParaRPr kumimoji="0" lang="en-US" sz="2000" b="0" i="0" u="none" strike="noStrike" kern="0" cap="none" spc="0" normalizeH="0" baseline="0" noProof="0" dirty="0">
+              <a:endParaRPr kumimoji="0" lang="en-US" sz="2000" b="0" i="0" u="none" strike="noStrike" kern="0" cap="none" spc="0" normalizeH="0" baseline="0" noProof="0">
                 <a:ln>
                   <a:noFill/>
                 </a:ln>
@@ -23480,7 +23359,7 @@
                 <a:tabLst/>
                 <a:defRPr/>
               </a:pPr>
-              <a:endParaRPr kumimoji="0" lang="en-US" sz="1800" b="0" i="0" u="none" strike="noStrike" kern="0" cap="none" spc="0" normalizeH="0" baseline="0" noProof="0" dirty="0">
+              <a:endParaRPr kumimoji="0" lang="en-US" sz="1800" b="0" i="0" u="none" strike="noStrike" kern="0" cap="none" spc="0" normalizeH="0" baseline="0" noProof="0">
                 <a:ln>
                   <a:noFill/>
                 </a:ln>
@@ -23646,7 +23525,6 @@
               <a:rPr lang="en-US"/>
               <a:t>Click to edit Master title style</a:t>
             </a:r>
-            <a:endParaRPr lang="en-US" dirty="0"/>
           </a:p>
         </p:txBody>
       </p:sp>
@@ -23717,7 +23595,6 @@
               <a:rPr lang="en-US"/>
               <a:t>Click icon to add picture</a:t>
             </a:r>
-            <a:endParaRPr lang="en-US" dirty="0"/>
           </a:p>
         </p:txBody>
       </p:sp>
@@ -23907,7 +23784,7 @@
                 <a:tabLst/>
                 <a:defRPr/>
               </a:pPr>
-              <a:endParaRPr kumimoji="0" lang="en-US" sz="2000" b="0" i="0" u="none" strike="noStrike" kern="0" cap="none" spc="0" normalizeH="0" baseline="0" noProof="0" dirty="0">
+              <a:endParaRPr kumimoji="0" lang="en-US" sz="2000" b="0" i="0" u="none" strike="noStrike" kern="0" cap="none" spc="0" normalizeH="0" baseline="0" noProof="0">
                 <a:ln>
                   <a:noFill/>
                 </a:ln>
@@ -23968,7 +23845,7 @@
                 <a:tabLst/>
                 <a:defRPr/>
               </a:pPr>
-              <a:endParaRPr kumimoji="0" lang="en-US" sz="1800" b="0" i="0" u="none" strike="noStrike" kern="0" cap="none" spc="0" normalizeH="0" baseline="0" noProof="0" dirty="0">
+              <a:endParaRPr kumimoji="0" lang="en-US" sz="1800" b="0" i="0" u="none" strike="noStrike" kern="0" cap="none" spc="0" normalizeH="0" baseline="0" noProof="0">
                 <a:ln>
                   <a:noFill/>
                 </a:ln>
@@ -24073,7 +23950,6 @@
               <a:rPr lang="en-US"/>
               <a:t>Click to edit Master title style</a:t>
             </a:r>
-            <a:endParaRPr lang="en-US" dirty="0"/>
           </a:p>
         </p:txBody>
       </p:sp>
@@ -24135,7 +24011,6 @@
               <a:rPr lang="en-US"/>
               <a:t>Fifth level</a:t>
             </a:r>
-            <a:endParaRPr lang="en-US" dirty="0"/>
           </a:p>
         </p:txBody>
       </p:sp>
@@ -24297,7 +24172,7 @@
                 <a:tabLst/>
                 <a:defRPr/>
               </a:pPr>
-              <a:endParaRPr kumimoji="0" lang="en-US" sz="2000" b="0" i="0" u="none" strike="noStrike" kern="0" cap="none" spc="0" normalizeH="0" baseline="0" noProof="0" dirty="0">
+              <a:endParaRPr kumimoji="0" lang="en-US" sz="2000" b="0" i="0" u="none" strike="noStrike" kern="0" cap="none" spc="0" normalizeH="0" baseline="0" noProof="0">
                 <a:ln>
                   <a:noFill/>
                 </a:ln>
@@ -24358,7 +24233,7 @@
                 <a:tabLst/>
                 <a:defRPr/>
               </a:pPr>
-              <a:endParaRPr kumimoji="0" lang="en-US" sz="1800" b="0" i="0" u="none" strike="noStrike" kern="0" cap="none" spc="0" normalizeH="0" baseline="0" noProof="0" dirty="0">
+              <a:endParaRPr kumimoji="0" lang="en-US" sz="1800" b="0" i="0" u="none" strike="noStrike" kern="0" cap="none" spc="0" normalizeH="0" baseline="0" noProof="0">
                 <a:ln>
                   <a:noFill/>
                 </a:ln>
@@ -24859,13 +24734,13 @@
           <a:lstStyle/>
           <a:p>
             <a:r>
-              <a:rPr lang="en-US" sz="2000" b="1" dirty="0">
+              <a:rPr lang="en-US" sz="2000" b="1">
                 <a:latin typeface="Times New Roman"/>
                 <a:cs typeface="Times New Roman"/>
               </a:rPr>
               <a:t>CSE 4316 -SENIOR DESIGN </a:t>
             </a:r>
-            <a:endParaRPr lang="en-US" sz="2000" b="1" dirty="0">
+            <a:endParaRPr lang="en-US" sz="2000" b="1">
               <a:latin typeface="Times New Roman" panose="02020603050405020304" pitchFamily="18" charset="0"/>
               <a:cs typeface="Times New Roman" panose="02020603050405020304" pitchFamily="18" charset="0"/>
             </a:endParaRPr>
@@ -24876,7 +24751,7 @@
               <a:buChar char="§"/>
             </a:pPr>
             <a:r>
-              <a:rPr lang="en-US" sz="2000" b="1" dirty="0">
+              <a:rPr lang="en-US" sz="2000" b="1">
                 <a:latin typeface="Times New Roman"/>
                 <a:cs typeface="Times New Roman"/>
               </a:rPr>
@@ -24889,7 +24764,7 @@
               <a:buChar char="§"/>
             </a:pPr>
             <a:r>
-              <a:rPr lang="en-US" sz="2000" b="1" dirty="0">
+              <a:rPr lang="en-US" sz="2000" b="1">
                 <a:latin typeface="Times New Roman"/>
                 <a:cs typeface="Times New Roman"/>
               </a:rPr>
@@ -24902,7 +24777,7 @@
               <a:buChar char="§"/>
             </a:pPr>
             <a:r>
-              <a:rPr lang="en-US" sz="2000" b="1" dirty="0">
+              <a:rPr lang="en-US" sz="2000" b="1">
                 <a:latin typeface="Times New Roman"/>
                 <a:cs typeface="Times New Roman"/>
               </a:rPr>
@@ -24915,7 +24790,7 @@
               <a:buChar char="§"/>
             </a:pPr>
             <a:r>
-              <a:rPr lang="en-US" sz="2000" b="1" dirty="0">
+              <a:rPr lang="en-US" sz="2000" b="1">
                 <a:latin typeface="Times New Roman"/>
                 <a:cs typeface="Times New Roman"/>
               </a:rPr>
@@ -24928,7 +24803,7 @@
               <a:buChar char="§"/>
             </a:pPr>
             <a:r>
-              <a:rPr lang="en-US" sz="2000" b="1" dirty="0">
+              <a:rPr lang="en-US" sz="2000" b="1">
                 <a:latin typeface="Times New Roman"/>
                 <a:cs typeface="Times New Roman"/>
               </a:rPr>
@@ -24940,7 +24815,7 @@
               <a:buFont typeface="Wingdings" pitchFamily="2" charset="2"/>
               <a:buChar char="§"/>
             </a:pPr>
-            <a:endParaRPr lang="en-US" sz="2000" dirty="0">
+            <a:endParaRPr lang="en-US" sz="2000">
               <a:latin typeface="Times New Roman" panose="02020603050405020304" pitchFamily="18" charset="0"/>
               <a:cs typeface="Times New Roman" panose="02020603050405020304" pitchFamily="18" charset="0"/>
             </a:endParaRPr>
@@ -24950,14 +24825,14 @@
               <a:buFont typeface="Wingdings" pitchFamily="2" charset="2"/>
               <a:buChar char="§"/>
             </a:pPr>
-            <a:endParaRPr lang="en-US" sz="2000" dirty="0"/>
+            <a:endParaRPr lang="en-US" sz="2000"/>
           </a:p>
           <a:p>
             <a:pPr indent="-182880">
               <a:buFont typeface="Wingdings" pitchFamily="2" charset="2"/>
               <a:buChar char="§"/>
             </a:pPr>
-            <a:endParaRPr lang="en-US" sz="2000" dirty="0"/>
+            <a:endParaRPr lang="en-US" sz="2000"/>
           </a:p>
         </p:txBody>
       </p:sp>
@@ -25143,7 +25018,7 @@
           <a:p>
             <a:pPr algn="ctr"/>
             <a:r>
-              <a:rPr lang="en-US" sz="4000" b="1" dirty="0">
+              <a:rPr lang="en-US" sz="4000" b="1">
                 <a:latin typeface="Times New Roman"/>
                 <a:cs typeface="Times New Roman"/>
               </a:rPr>
@@ -25252,7 +25127,7 @@
                 <a:tabLst/>
                 <a:defRPr/>
               </a:pPr>
-              <a:endParaRPr kumimoji="0" lang="en-US" sz="2000" b="0" i="0" u="none" strike="noStrike" kern="0" cap="none" spc="0" normalizeH="0" baseline="0" noProof="0" dirty="0">
+              <a:endParaRPr kumimoji="0" lang="en-US" sz="2000" b="0" i="0" u="none" strike="noStrike" kern="0" cap="none" spc="0" normalizeH="0" baseline="0" noProof="0">
                 <a:ln>
                   <a:noFill/>
                 </a:ln>
@@ -25328,7 +25203,7 @@
                 <a:tabLst/>
                 <a:defRPr/>
               </a:pPr>
-              <a:endParaRPr kumimoji="0" lang="en-US" sz="1800" b="0" i="0" u="none" strike="noStrike" kern="0" cap="none" spc="0" normalizeH="0" baseline="0" noProof="0" dirty="0">
+              <a:endParaRPr kumimoji="0" lang="en-US" sz="1800" b="0" i="0" u="none" strike="noStrike" kern="0" cap="none" spc="0" normalizeH="0" baseline="0" noProof="0">
                 <a:ln>
                   <a:noFill/>
                 </a:ln>
@@ -25587,7 +25462,7 @@
           <a:p>
             <a:pPr algn="ctr"/>
             <a:r>
-              <a:rPr lang="en-US" sz="6000" b="1" dirty="0">
+              <a:rPr lang="en-US" sz="6000" b="1">
                 <a:latin typeface="Times New Roman" panose="02020603050405020304" pitchFamily="18" charset="0"/>
                 <a:cs typeface="Times New Roman" panose="02020603050405020304" pitchFamily="18" charset="0"/>
               </a:rPr>
@@ -25746,7 +25621,7 @@
             <p:ph idx="1"/>
             <p:extLst>
               <p:ext uri="{D42A27DB-BD31-4B8C-83A1-F6EECF244321}">
-                <p14:modId xmlns:p14="http://schemas.microsoft.com/office/powerpoint/2010/main" val="3755233737"/>
+                <p14:modId xmlns:p14="http://schemas.microsoft.com/office/powerpoint/2010/main" val="1343010973"/>
               </p:ext>
             </p:extLst>
           </p:nvPr>
@@ -26043,7 +25918,7 @@
               <a:tabLst/>
               <a:defRPr/>
             </a:pPr>
-            <a:endParaRPr kumimoji="0" lang="en-US" sz="2000" b="0" i="0" u="none" strike="noStrike" kern="0" cap="none" spc="0" normalizeH="0" baseline="0" noProof="0" dirty="0">
+            <a:endParaRPr kumimoji="0" lang="en-US" sz="2000" b="0" i="0" u="none" strike="noStrike" kern="0" cap="none" spc="0" normalizeH="0" baseline="0" noProof="0">
               <a:ln>
                 <a:noFill/>
               </a:ln>
@@ -26121,7 +25996,7 @@
               <a:tabLst/>
               <a:defRPr/>
             </a:pPr>
-            <a:endParaRPr kumimoji="0" lang="en-US" sz="1800" b="0" i="0" u="none" strike="noStrike" kern="0" cap="none" spc="0" normalizeH="0" baseline="0" noProof="0" dirty="0">
+            <a:endParaRPr kumimoji="0" lang="en-US" sz="1800" b="0" i="0" u="none" strike="noStrike" kern="0" cap="none" spc="0" normalizeH="0" baseline="0" noProof="0">
               <a:ln>
                 <a:noFill/>
               </a:ln>
@@ -26169,7 +26044,7 @@
           <a:p>
             <a:pPr algn="ctr"/>
             <a:r>
-              <a:rPr lang="en-US" sz="3000" b="1" dirty="0">
+              <a:rPr lang="en-US" sz="3000" b="1">
                 <a:solidFill>
                   <a:srgbClr val="FFFFFF"/>
                 </a:solidFill>
@@ -26179,7 +26054,7 @@
               <a:t>Individual</a:t>
             </a:r>
             <a:br>
-              <a:rPr lang="en-US" sz="3000" b="1" dirty="0">
+              <a:rPr lang="en-US" sz="3000" b="1">
                 <a:solidFill>
                   <a:srgbClr val="FFFFFF"/>
                 </a:solidFill>
@@ -26188,7 +26063,7 @@
               </a:rPr>
             </a:br>
             <a:r>
-              <a:rPr lang="en-US" sz="3000" b="1" dirty="0">
+              <a:rPr lang="en-US" sz="3000" b="1">
                 <a:solidFill>
                   <a:srgbClr val="FFFFFF"/>
                 </a:solidFill>
@@ -26290,14 +26165,14 @@
             <p:ph idx="1"/>
             <p:extLst>
               <p:ext uri="{D42A27DB-BD31-4B8C-83A1-F6EECF244321}">
-                <p14:modId xmlns:p14="http://schemas.microsoft.com/office/powerpoint/2010/main" val="1942787751"/>
+                <p14:modId xmlns:p14="http://schemas.microsoft.com/office/powerpoint/2010/main" val="1983521874"/>
               </p:ext>
             </p:extLst>
           </p:nvPr>
         </p:nvGraphicFramePr>
         <p:xfrm>
-          <a:off x="6081713" y="725488"/>
-          <a:ext cx="5141912" cy="5407025"/>
+          <a:off x="6088170" y="725488"/>
+          <a:ext cx="5238777" cy="5407025"/>
         </p:xfrm>
         <a:graphic>
           <a:graphicData uri="http://schemas.openxmlformats.org/drawingml/2006/diagram">
@@ -26458,13 +26333,13 @@
           <a:p>
             <a:pPr algn="ctr"/>
             <a:r>
-              <a:rPr lang="en-US" sz="4000" b="1" dirty="0">
+              <a:rPr lang="en-US" sz="4000" b="1">
                 <a:latin typeface="Times New Roman"/>
                 <a:cs typeface="Times New Roman"/>
               </a:rPr>
               <a:t>Team roles</a:t>
             </a:r>
-            <a:endParaRPr lang="en-US" sz="4000" b="1" dirty="0">
+            <a:endParaRPr lang="en-US" sz="4000" b="1">
               <a:latin typeface="Times New Roman" panose="02020603050405020304" pitchFamily="18" charset="0"/>
               <a:cs typeface="Times New Roman" panose="02020603050405020304" pitchFamily="18" charset="0"/>
             </a:endParaRPr>
@@ -26571,7 +26446,7 @@
                 <a:tabLst/>
                 <a:defRPr/>
               </a:pPr>
-              <a:endParaRPr kumimoji="0" lang="en-US" sz="2000" b="0" i="0" u="none" strike="noStrike" kern="0" cap="none" spc="0" normalizeH="0" baseline="0" noProof="0" dirty="0">
+              <a:endParaRPr kumimoji="0" lang="en-US" sz="2000" b="0" i="0" u="none" strike="noStrike" kern="0" cap="none" spc="0" normalizeH="0" baseline="0" noProof="0">
                 <a:ln>
                   <a:noFill/>
                 </a:ln>
@@ -26647,7 +26522,7 @@
                 <a:tabLst/>
                 <a:defRPr/>
               </a:pPr>
-              <a:endParaRPr kumimoji="0" lang="en-US" sz="1800" b="0" i="0" u="none" strike="noStrike" kern="0" cap="none" spc="0" normalizeH="0" baseline="0" noProof="0" dirty="0">
+              <a:endParaRPr kumimoji="0" lang="en-US" sz="1800" b="0" i="0" u="none" strike="noStrike" kern="0" cap="none" spc="0" normalizeH="0" baseline="0" noProof="0">
                 <a:ln>
                   <a:noFill/>
                 </a:ln>
@@ -26681,13 +26556,13 @@
             <p:ph idx="1"/>
             <p:extLst>
               <p:ext uri="{D42A27DB-BD31-4B8C-83A1-F6EECF244321}">
-                <p14:modId xmlns:p14="http://schemas.microsoft.com/office/powerpoint/2010/main" val="2225617943"/>
+                <p14:modId xmlns:p14="http://schemas.microsoft.com/office/powerpoint/2010/main" val="1455109913"/>
               </p:ext>
             </p:extLst>
           </p:nvPr>
         </p:nvGraphicFramePr>
         <p:xfrm>
-          <a:off x="287042" y="638068"/>
+          <a:off x="287042" y="523049"/>
           <a:ext cx="7372715" cy="5593562"/>
         </p:xfrm>
         <a:graphic>
@@ -27084,6 +26959,372 @@
     <p:extLst>
       <p:ext uri="{BB962C8B-B14F-4D97-AF65-F5344CB8AC3E}">
         <p14:creationId xmlns:p14="http://schemas.microsoft.com/office/powerpoint/2010/main" val="1878648308"/>
+      </p:ext>
+    </p:extLst>
+  </p:cSld>
+  <p:clrMapOvr>
+    <a:masterClrMapping/>
+  </p:clrMapOvr>
+</p:sld>
+</file>
+
+<file path=ppt/slides/slide7.xml><?xml version="1.0" encoding="utf-8"?>
+<p:sld xmlns:a="http://schemas.openxmlformats.org/drawingml/2006/main" xmlns:r="http://schemas.openxmlformats.org/officeDocument/2006/relationships" xmlns:p="http://schemas.openxmlformats.org/presentationml/2006/main">
+  <p:cSld>
+    <p:bg>
+      <p:bgPr>
+        <a:solidFill>
+          <a:schemeClr val="bg1"/>
+        </a:solidFill>
+        <a:effectLst/>
+      </p:bgPr>
+    </p:bg>
+    <p:spTree>
+      <p:nvGrpSpPr>
+        <p:cNvPr id="1" name=""/>
+        <p:cNvGrpSpPr/>
+        <p:nvPr/>
+      </p:nvGrpSpPr>
+      <p:grpSpPr>
+        <a:xfrm>
+          <a:off x="0" y="0"/>
+          <a:ext cx="0" cy="0"/>
+          <a:chOff x="0" y="0"/>
+          <a:chExt cx="0" cy="0"/>
+        </a:xfrm>
+      </p:grpSpPr>
+      <p:sp useBgFill="1">
+        <p:nvSpPr>
+          <p:cNvPr id="25" name="Rectangle 24">
+            <a:extLst>
+              <a:ext uri="{FF2B5EF4-FFF2-40B4-BE49-F238E27FC236}">
+                <a16:creationId xmlns:a16="http://schemas.microsoft.com/office/drawing/2014/main" id="{037DD5FF-25DE-48A7-970B-DFA4A2C3F947}"/>
+              </a:ext>
+              <a:ext uri="{C183D7F6-B498-43B3-948B-1728B52AA6E4}">
+                <adec:decorative xmlns:adec="http://schemas.microsoft.com/office/drawing/2017/decorative" val="1"/>
+              </a:ext>
+            </a:extLst>
+          </p:cNvPr>
+          <p:cNvSpPr>
+            <a:spLocks noGrp="1" noRot="1" noChangeAspect="1" noMove="1" noResize="1" noEditPoints="1" noAdjustHandles="1" noChangeArrowheads="1" noChangeShapeType="1" noTextEdit="1"/>
+          </p:cNvSpPr>
+          <p:nvPr>
+            <p:extLst>
+              <p:ext uri="{386F3935-93C4-4BCD-93E2-E3B085C9AB24}">
+                <p16:designElem xmlns:p16="http://schemas.microsoft.com/office/powerpoint/2015/main" val="1"/>
+              </p:ext>
+            </p:extLst>
+          </p:nvPr>
+        </p:nvSpPr>
+        <p:spPr>
+          <a:xfrm>
+            <a:off x="0" y="0"/>
+            <a:ext cx="12192000" cy="6858000"/>
+          </a:xfrm>
+          <a:prstGeom prst="rect">
+            <a:avLst/>
+          </a:prstGeom>
+          <a:ln>
+            <a:noFill/>
+          </a:ln>
+        </p:spPr>
+        <p:style>
+          <a:lnRef idx="2">
+            <a:schemeClr val="accent1">
+              <a:shade val="50000"/>
+            </a:schemeClr>
+          </a:lnRef>
+          <a:fillRef idx="1">
+            <a:schemeClr val="accent1"/>
+          </a:fillRef>
+          <a:effectRef idx="0">
+            <a:schemeClr val="accent1"/>
+          </a:effectRef>
+          <a:fontRef idx="minor">
+            <a:schemeClr val="lt1"/>
+          </a:fontRef>
+        </p:style>
+        <p:txBody>
+          <a:bodyPr rtlCol="0" anchor="ctr"/>
+          <a:lstStyle/>
+          <a:p>
+            <a:pPr algn="ctr"/>
+            <a:endParaRPr lang="en-US"/>
+          </a:p>
+        </p:txBody>
+      </p:sp>
+      <p:sp>
+        <p:nvSpPr>
+          <p:cNvPr id="27" name="Rectangle 26">
+            <a:extLst>
+              <a:ext uri="{FF2B5EF4-FFF2-40B4-BE49-F238E27FC236}">
+                <a16:creationId xmlns:a16="http://schemas.microsoft.com/office/drawing/2014/main" id="{D79D8625-268D-4585-A435-24EDB4A17B65}"/>
+              </a:ext>
+              <a:ext uri="{C183D7F6-B498-43B3-948B-1728B52AA6E4}">
+                <adec:decorative xmlns:adec="http://schemas.microsoft.com/office/drawing/2017/decorative" val="1"/>
+              </a:ext>
+            </a:extLst>
+          </p:cNvPr>
+          <p:cNvSpPr>
+            <a:spLocks noGrp="1" noRot="1" noChangeAspect="1" noMove="1" noResize="1" noEditPoints="1" noAdjustHandles="1" noChangeArrowheads="1" noChangeShapeType="1" noTextEdit="1"/>
+          </p:cNvSpPr>
+          <p:nvPr>
+            <p:extLst>
+              <p:ext uri="{386F3935-93C4-4BCD-93E2-E3B085C9AB24}">
+                <p16:designElem xmlns:p16="http://schemas.microsoft.com/office/powerpoint/2015/main" val="1"/>
+              </p:ext>
+            </p:extLst>
+          </p:nvPr>
+        </p:nvSpPr>
+        <p:spPr>
+          <a:xfrm>
+            <a:off x="0" y="0"/>
+            <a:ext cx="12191999" cy="6857999"/>
+          </a:xfrm>
+          <a:prstGeom prst="rect">
+            <a:avLst/>
+          </a:prstGeom>
+          <a:blipFill dpi="0" rotWithShape="1">
+            <a:blip r:embed="rId2">
+              <a:alphaModFix amt="60000"/>
+              <a:lum bright="70000" contrast="-70000"/>
+              <a:extLst>
+                <a:ext uri="{BEBA8EAE-BF5A-486C-A8C5-ECC9F3942E4B}">
+                  <a14:imgProps xmlns:a14="http://schemas.microsoft.com/office/drawing/2010/main">
+                    <a14:imgLayer r:embed="rId3">
+                      <a14:imgEffect>
+                        <a14:sharpenSoften amount="61000"/>
+                      </a14:imgEffect>
+                    </a14:imgLayer>
+                  </a14:imgProps>
+                </a:ext>
+                <a:ext uri="{28A0092B-C50C-407E-A947-70E740481C1C}">
+                  <a14:useLocalDpi xmlns:a14="http://schemas.microsoft.com/office/drawing/2010/main" val="0"/>
+                </a:ext>
+              </a:extLst>
+            </a:blip>
+            <a:srcRect/>
+            <a:tile tx="0" ty="-704850" sx="92000" sy="89000" flip="xy" algn="ctr"/>
+          </a:blipFill>
+          <a:ln>
+            <a:noFill/>
+          </a:ln>
+        </p:spPr>
+        <p:style>
+          <a:lnRef idx="2">
+            <a:schemeClr val="accent1">
+              <a:shade val="50000"/>
+            </a:schemeClr>
+          </a:lnRef>
+          <a:fillRef idx="1">
+            <a:schemeClr val="accent1"/>
+          </a:fillRef>
+          <a:effectRef idx="0">
+            <a:schemeClr val="accent1"/>
+          </a:effectRef>
+          <a:fontRef idx="minor">
+            <a:schemeClr val="lt1"/>
+          </a:fontRef>
+        </p:style>
+      </p:sp>
+      <p:sp>
+        <p:nvSpPr>
+          <p:cNvPr id="29" name="Rectangle 28">
+            <a:extLst>
+              <a:ext uri="{FF2B5EF4-FFF2-40B4-BE49-F238E27FC236}">
+                <a16:creationId xmlns:a16="http://schemas.microsoft.com/office/drawing/2014/main" id="{7E80DA97-6AD0-404A-8AF9-8BB14347207A}"/>
+              </a:ext>
+              <a:ext uri="{C183D7F6-B498-43B3-948B-1728B52AA6E4}">
+                <adec:decorative xmlns:adec="http://schemas.microsoft.com/office/drawing/2017/decorative" val="1"/>
+              </a:ext>
+            </a:extLst>
+          </p:cNvPr>
+          <p:cNvSpPr>
+            <a:spLocks noGrp="1" noRot="1" noChangeAspect="1" noMove="1" noResize="1" noEditPoints="1" noAdjustHandles="1" noChangeArrowheads="1" noChangeShapeType="1" noTextEdit="1"/>
+          </p:cNvSpPr>
+          <p:nvPr>
+            <p:extLst>
+              <p:ext uri="{386F3935-93C4-4BCD-93E2-E3B085C9AB24}">
+                <p16:designElem xmlns:p16="http://schemas.microsoft.com/office/powerpoint/2015/main" val="1"/>
+              </p:ext>
+            </p:extLst>
+          </p:nvPr>
+        </p:nvSpPr>
+        <p:spPr>
+          <a:xfrm>
+            <a:off x="477012" y="480060"/>
+            <a:ext cx="5458120" cy="5897880"/>
+          </a:xfrm>
+          <a:prstGeom prst="rect">
+            <a:avLst/>
+          </a:prstGeom>
+          <a:solidFill>
+            <a:srgbClr val="FFFFFF"/>
+          </a:solidFill>
+          <a:ln w="22225">
+            <a:solidFill>
+              <a:schemeClr val="tx1">
+                <a:lumMod val="50000"/>
+                <a:lumOff val="50000"/>
+              </a:schemeClr>
+            </a:solidFill>
+          </a:ln>
+        </p:spPr>
+        <p:style>
+          <a:lnRef idx="2">
+            <a:schemeClr val="accent1">
+              <a:shade val="50000"/>
+            </a:schemeClr>
+          </a:lnRef>
+          <a:fillRef idx="1">
+            <a:schemeClr val="accent1"/>
+          </a:fillRef>
+          <a:effectRef idx="0">
+            <a:schemeClr val="accent1"/>
+          </a:effectRef>
+          <a:fontRef idx="minor">
+            <a:schemeClr val="lt1"/>
+          </a:fontRef>
+        </p:style>
+        <p:txBody>
+          <a:bodyPr rtlCol="0" anchor="ctr"/>
+          <a:lstStyle/>
+          <a:p>
+            <a:pPr algn="ctr"/>
+            <a:endParaRPr lang="en-US"/>
+          </a:p>
+        </p:txBody>
+      </p:sp>
+      <p:pic>
+        <p:nvPicPr>
+          <p:cNvPr id="3" name="Picture 3" descr="A picture containing drawing&#10;&#10;Description automatically generated">
+            <a:extLst>
+              <a:ext uri="{FF2B5EF4-FFF2-40B4-BE49-F238E27FC236}">
+                <a16:creationId xmlns:a16="http://schemas.microsoft.com/office/drawing/2014/main" id="{E2203B7B-98E8-4B55-9131-1ACC8B57E9C4}"/>
+              </a:ext>
+            </a:extLst>
+          </p:cNvPr>
+          <p:cNvPicPr>
+            <a:picLocks noChangeAspect="1"/>
+          </p:cNvPicPr>
+          <p:nvPr/>
+        </p:nvPicPr>
+        <p:blipFill rotWithShape="1">
+          <a:blip r:embed="rId4"/>
+          <a:srcRect l="7813" r="2119"/>
+          <a:stretch/>
+        </p:blipFill>
+        <p:spPr>
+          <a:xfrm>
+            <a:off x="520096" y="643467"/>
+            <a:ext cx="5372097" cy="5571066"/>
+          </a:xfrm>
+          <a:prstGeom prst="rect">
+            <a:avLst/>
+          </a:prstGeom>
+        </p:spPr>
+      </p:pic>
+      <p:sp>
+        <p:nvSpPr>
+          <p:cNvPr id="31" name="Rectangle 30">
+            <a:extLst>
+              <a:ext uri="{FF2B5EF4-FFF2-40B4-BE49-F238E27FC236}">
+                <a16:creationId xmlns:a16="http://schemas.microsoft.com/office/drawing/2014/main" id="{D3F6123B-68BF-4AA8-8973-B89BEB949CEE}"/>
+              </a:ext>
+              <a:ext uri="{C183D7F6-B498-43B3-948B-1728B52AA6E4}">
+                <adec:decorative xmlns:adec="http://schemas.microsoft.com/office/drawing/2017/decorative" val="1"/>
+              </a:ext>
+            </a:extLst>
+          </p:cNvPr>
+          <p:cNvSpPr>
+            <a:spLocks noGrp="1" noRot="1" noChangeAspect="1" noMove="1" noResize="1" noEditPoints="1" noAdjustHandles="1" noChangeArrowheads="1" noChangeShapeType="1" noTextEdit="1"/>
+          </p:cNvSpPr>
+          <p:nvPr>
+            <p:extLst>
+              <p:ext uri="{386F3935-93C4-4BCD-93E2-E3B085C9AB24}">
+                <p16:designElem xmlns:p16="http://schemas.microsoft.com/office/powerpoint/2015/main" val="1"/>
+              </p:ext>
+            </p:extLst>
+          </p:nvPr>
+        </p:nvSpPr>
+        <p:spPr>
+          <a:xfrm>
+            <a:off x="6256865" y="480060"/>
+            <a:ext cx="5458120" cy="5897880"/>
+          </a:xfrm>
+          <a:prstGeom prst="rect">
+            <a:avLst/>
+          </a:prstGeom>
+          <a:solidFill>
+            <a:srgbClr val="FFFFFF"/>
+          </a:solidFill>
+          <a:ln w="22225">
+            <a:solidFill>
+              <a:schemeClr val="tx1">
+                <a:lumMod val="50000"/>
+                <a:lumOff val="50000"/>
+              </a:schemeClr>
+            </a:solidFill>
+          </a:ln>
+        </p:spPr>
+        <p:style>
+          <a:lnRef idx="2">
+            <a:schemeClr val="accent1">
+              <a:shade val="50000"/>
+            </a:schemeClr>
+          </a:lnRef>
+          <a:fillRef idx="1">
+            <a:schemeClr val="accent1"/>
+          </a:fillRef>
+          <a:effectRef idx="0">
+            <a:schemeClr val="accent1"/>
+          </a:effectRef>
+          <a:fontRef idx="minor">
+            <a:schemeClr val="lt1"/>
+          </a:fontRef>
+        </p:style>
+        <p:txBody>
+          <a:bodyPr rtlCol="0" anchor="ctr"/>
+          <a:lstStyle/>
+          <a:p>
+            <a:pPr algn="ctr"/>
+            <a:endParaRPr lang="en-US"/>
+          </a:p>
+        </p:txBody>
+      </p:sp>
+      <p:pic>
+        <p:nvPicPr>
+          <p:cNvPr id="2" name="Picture 2" descr="A close up of an engine&#10;&#10;Description automatically generated">
+            <a:extLst>
+              <a:ext uri="{FF2B5EF4-FFF2-40B4-BE49-F238E27FC236}">
+                <a16:creationId xmlns:a16="http://schemas.microsoft.com/office/drawing/2014/main" id="{A87B06DC-5DB6-45EE-A8BA-7D40FD1F1762}"/>
+              </a:ext>
+            </a:extLst>
+          </p:cNvPr>
+          <p:cNvPicPr>
+            <a:picLocks noChangeAspect="1"/>
+          </p:cNvPicPr>
+          <p:nvPr/>
+        </p:nvPicPr>
+        <p:blipFill rotWithShape="1">
+          <a:blip r:embed="rId5"/>
+          <a:srcRect l="6533" r="24393" b="-1"/>
+          <a:stretch/>
+        </p:blipFill>
+        <p:spPr>
+          <a:xfrm>
+            <a:off x="6423320" y="643467"/>
+            <a:ext cx="5130797" cy="5571066"/>
+          </a:xfrm>
+          <a:prstGeom prst="rect">
+            <a:avLst/>
+          </a:prstGeom>
+        </p:spPr>
+      </p:pic>
+    </p:spTree>
+    <p:extLst>
+      <p:ext uri="{BB962C8B-B14F-4D97-AF65-F5344CB8AC3E}">
+        <p14:creationId xmlns:p14="http://schemas.microsoft.com/office/powerpoint/2010/main" val="2604295354"/>
       </p:ext>
     </p:extLst>
   </p:cSld>

</xml_diff>